<commit_message>
Updated changes as per tap comments
- install ignitors after pix by rocket
</commit_message>
<xml_diff>
--- a/4inin L3 redo Visual Checklist  20191122.pptx
+++ b/4inin L3 redo Visual Checklist  20191122.pptx
@@ -109,7 +109,7 @@
   </p:defaultTextStyle>
   <p:extLst>
     <p:ext uri="{EFAFB233-063F-42B5-8137-9DF3F51BA10A}">
-      <p15:sldGuideLst xmlns:p15="http://schemas.microsoft.com/office/powerpoint/2012/main" xmlns="">
+      <p15:sldGuideLst xmlns="" xmlns:p15="http://schemas.microsoft.com/office/powerpoint/2012/main">
         <p15:guide id="1" orient="horz" pos="2160">
           <p15:clr>
             <a:srgbClr val="A4A3A4"/>
@@ -209,7 +209,7 @@
             <a:fld id="{7D53F579-93E2-4493-8F89-9F84C4147133}" type="datetimeFigureOut">
               <a:rPr lang="en-US" smtClean="0"/>
               <a:pPr/>
-              <a:t>12/12/2019</a:t>
+              <a:t>2/17/2020</a:t>
             </a:fld>
             <a:endParaRPr lang="en-US"/>
           </a:p>
@@ -689,7 +689,7 @@
             <a:fld id="{4E660BD3-8963-4C33-8393-80574CA9A839}" type="datetimeFigureOut">
               <a:rPr lang="en-US" smtClean="0"/>
               <a:pPr/>
-              <a:t>12/12/2019</a:t>
+              <a:t>2/17/2020</a:t>
             </a:fld>
             <a:endParaRPr lang="en-US"/>
           </a:p>
@@ -741,7 +741,7 @@
     </p:spTree>
     <p:extLst>
       <p:ext uri="{BB962C8B-B14F-4D97-AF65-F5344CB8AC3E}">
-        <p14:creationId xmlns:p14="http://schemas.microsoft.com/office/powerpoint/2010/main" xmlns="" val="4117866318"/>
+        <p14:creationId xmlns="" xmlns:p14="http://schemas.microsoft.com/office/powerpoint/2010/main" val="4117866318"/>
       </p:ext>
     </p:extLst>
   </p:cSld>
@@ -861,7 +861,7 @@
             <a:fld id="{4E660BD3-8963-4C33-8393-80574CA9A839}" type="datetimeFigureOut">
               <a:rPr lang="en-US" smtClean="0"/>
               <a:pPr/>
-              <a:t>12/12/2019</a:t>
+              <a:t>2/17/2020</a:t>
             </a:fld>
             <a:endParaRPr lang="en-US"/>
           </a:p>
@@ -913,7 +913,7 @@
     </p:spTree>
     <p:extLst>
       <p:ext uri="{BB962C8B-B14F-4D97-AF65-F5344CB8AC3E}">
-        <p14:creationId xmlns:p14="http://schemas.microsoft.com/office/powerpoint/2010/main" xmlns="" val="1321070492"/>
+        <p14:creationId xmlns="" xmlns:p14="http://schemas.microsoft.com/office/powerpoint/2010/main" val="1321070492"/>
       </p:ext>
     </p:extLst>
   </p:cSld>
@@ -1043,7 +1043,7 @@
             <a:fld id="{4E660BD3-8963-4C33-8393-80574CA9A839}" type="datetimeFigureOut">
               <a:rPr lang="en-US" smtClean="0"/>
               <a:pPr/>
-              <a:t>12/12/2019</a:t>
+              <a:t>2/17/2020</a:t>
             </a:fld>
             <a:endParaRPr lang="en-US"/>
           </a:p>
@@ -1095,7 +1095,7 @@
     </p:spTree>
     <p:extLst>
       <p:ext uri="{BB962C8B-B14F-4D97-AF65-F5344CB8AC3E}">
-        <p14:creationId xmlns:p14="http://schemas.microsoft.com/office/powerpoint/2010/main" xmlns="" val="2861801522"/>
+        <p14:creationId xmlns="" xmlns:p14="http://schemas.microsoft.com/office/powerpoint/2010/main" val="2861801522"/>
       </p:ext>
     </p:extLst>
   </p:cSld>
@@ -1215,7 +1215,7 @@
             <a:fld id="{4E660BD3-8963-4C33-8393-80574CA9A839}" type="datetimeFigureOut">
               <a:rPr lang="en-US" smtClean="0"/>
               <a:pPr/>
-              <a:t>12/12/2019</a:t>
+              <a:t>2/17/2020</a:t>
             </a:fld>
             <a:endParaRPr lang="en-US"/>
           </a:p>
@@ -1267,7 +1267,7 @@
     </p:spTree>
     <p:extLst>
       <p:ext uri="{BB962C8B-B14F-4D97-AF65-F5344CB8AC3E}">
-        <p14:creationId xmlns:p14="http://schemas.microsoft.com/office/powerpoint/2010/main" xmlns="" val="2095606258"/>
+        <p14:creationId xmlns="" xmlns:p14="http://schemas.microsoft.com/office/powerpoint/2010/main" val="2095606258"/>
       </p:ext>
     </p:extLst>
   </p:cSld>
@@ -1463,7 +1463,7 @@
             <a:fld id="{4E660BD3-8963-4C33-8393-80574CA9A839}" type="datetimeFigureOut">
               <a:rPr lang="en-US" smtClean="0"/>
               <a:pPr/>
-              <a:t>12/12/2019</a:t>
+              <a:t>2/17/2020</a:t>
             </a:fld>
             <a:endParaRPr lang="en-US"/>
           </a:p>
@@ -1515,7 +1515,7 @@
     </p:spTree>
     <p:extLst>
       <p:ext uri="{BB962C8B-B14F-4D97-AF65-F5344CB8AC3E}">
-        <p14:creationId xmlns:p14="http://schemas.microsoft.com/office/powerpoint/2010/main" xmlns="" val="1090210665"/>
+        <p14:creationId xmlns="" xmlns:p14="http://schemas.microsoft.com/office/powerpoint/2010/main" val="1090210665"/>
       </p:ext>
     </p:extLst>
   </p:cSld>
@@ -1697,7 +1697,7 @@
             <a:fld id="{4E660BD3-8963-4C33-8393-80574CA9A839}" type="datetimeFigureOut">
               <a:rPr lang="en-US" smtClean="0"/>
               <a:pPr/>
-              <a:t>12/12/2019</a:t>
+              <a:t>2/17/2020</a:t>
             </a:fld>
             <a:endParaRPr lang="en-US"/>
           </a:p>
@@ -1749,7 +1749,7 @@
     </p:spTree>
     <p:extLst>
       <p:ext uri="{BB962C8B-B14F-4D97-AF65-F5344CB8AC3E}">
-        <p14:creationId xmlns:p14="http://schemas.microsoft.com/office/powerpoint/2010/main" xmlns="" val="3393881859"/>
+        <p14:creationId xmlns="" xmlns:p14="http://schemas.microsoft.com/office/powerpoint/2010/main" val="3393881859"/>
       </p:ext>
     </p:extLst>
   </p:cSld>
@@ -2066,7 +2066,7 @@
             <a:fld id="{4E660BD3-8963-4C33-8393-80574CA9A839}" type="datetimeFigureOut">
               <a:rPr lang="en-US" smtClean="0"/>
               <a:pPr/>
-              <a:t>12/12/2019</a:t>
+              <a:t>2/17/2020</a:t>
             </a:fld>
             <a:endParaRPr lang="en-US"/>
           </a:p>
@@ -2118,7 +2118,7 @@
     </p:spTree>
     <p:extLst>
       <p:ext uri="{BB962C8B-B14F-4D97-AF65-F5344CB8AC3E}">
-        <p14:creationId xmlns:p14="http://schemas.microsoft.com/office/powerpoint/2010/main" xmlns="" val="1575907112"/>
+        <p14:creationId xmlns="" xmlns:p14="http://schemas.microsoft.com/office/powerpoint/2010/main" val="1575907112"/>
       </p:ext>
     </p:extLst>
   </p:cSld>
@@ -2186,7 +2186,7 @@
             <a:fld id="{4E660BD3-8963-4C33-8393-80574CA9A839}" type="datetimeFigureOut">
               <a:rPr lang="en-US" smtClean="0"/>
               <a:pPr/>
-              <a:t>12/12/2019</a:t>
+              <a:t>2/17/2020</a:t>
             </a:fld>
             <a:endParaRPr lang="en-US"/>
           </a:p>
@@ -2238,7 +2238,7 @@
     </p:spTree>
     <p:extLst>
       <p:ext uri="{BB962C8B-B14F-4D97-AF65-F5344CB8AC3E}">
-        <p14:creationId xmlns:p14="http://schemas.microsoft.com/office/powerpoint/2010/main" xmlns="" val="3673902886"/>
+        <p14:creationId xmlns="" xmlns:p14="http://schemas.microsoft.com/office/powerpoint/2010/main" val="3673902886"/>
       </p:ext>
     </p:extLst>
   </p:cSld>
@@ -2283,7 +2283,7 @@
             <a:fld id="{4E660BD3-8963-4C33-8393-80574CA9A839}" type="datetimeFigureOut">
               <a:rPr lang="en-US" smtClean="0"/>
               <a:pPr/>
-              <a:t>12/12/2019</a:t>
+              <a:t>2/17/2020</a:t>
             </a:fld>
             <a:endParaRPr lang="en-US"/>
           </a:p>
@@ -2335,7 +2335,7 @@
     </p:spTree>
     <p:extLst>
       <p:ext uri="{BB962C8B-B14F-4D97-AF65-F5344CB8AC3E}">
-        <p14:creationId xmlns:p14="http://schemas.microsoft.com/office/powerpoint/2010/main" xmlns="" val="2564443960"/>
+        <p14:creationId xmlns="" xmlns:p14="http://schemas.microsoft.com/office/powerpoint/2010/main" val="2564443960"/>
       </p:ext>
     </p:extLst>
   </p:cSld>
@@ -2562,7 +2562,7 @@
             <a:fld id="{4E660BD3-8963-4C33-8393-80574CA9A839}" type="datetimeFigureOut">
               <a:rPr lang="en-US" smtClean="0"/>
               <a:pPr/>
-              <a:t>12/12/2019</a:t>
+              <a:t>2/17/2020</a:t>
             </a:fld>
             <a:endParaRPr lang="en-US"/>
           </a:p>
@@ -2614,7 +2614,7 @@
     </p:spTree>
     <p:extLst>
       <p:ext uri="{BB962C8B-B14F-4D97-AF65-F5344CB8AC3E}">
-        <p14:creationId xmlns:p14="http://schemas.microsoft.com/office/powerpoint/2010/main" xmlns="" val="720308840"/>
+        <p14:creationId xmlns="" xmlns:p14="http://schemas.microsoft.com/office/powerpoint/2010/main" val="720308840"/>
       </p:ext>
     </p:extLst>
   </p:cSld>
@@ -2817,7 +2817,7 @@
             <a:fld id="{4E660BD3-8963-4C33-8393-80574CA9A839}" type="datetimeFigureOut">
               <a:rPr lang="en-US" smtClean="0"/>
               <a:pPr/>
-              <a:t>12/12/2019</a:t>
+              <a:t>2/17/2020</a:t>
             </a:fld>
             <a:endParaRPr lang="en-US"/>
           </a:p>
@@ -2869,7 +2869,7 @@
     </p:spTree>
     <p:extLst>
       <p:ext uri="{BB962C8B-B14F-4D97-AF65-F5344CB8AC3E}">
-        <p14:creationId xmlns:p14="http://schemas.microsoft.com/office/powerpoint/2010/main" xmlns="" val="2991676627"/>
+        <p14:creationId xmlns="" xmlns:p14="http://schemas.microsoft.com/office/powerpoint/2010/main" val="2991676627"/>
       </p:ext>
     </p:extLst>
   </p:cSld>
@@ -3032,7 +3032,7 @@
             <a:fld id="{4E660BD3-8963-4C33-8393-80574CA9A839}" type="datetimeFigureOut">
               <a:rPr lang="en-US" smtClean="0"/>
               <a:pPr/>
-              <a:t>12/12/2019</a:t>
+              <a:t>2/17/2020</a:t>
             </a:fld>
             <a:endParaRPr lang="en-US"/>
           </a:p>
@@ -3120,7 +3120,7 @@
     </p:spTree>
     <p:extLst>
       <p:ext uri="{BB962C8B-B14F-4D97-AF65-F5344CB8AC3E}">
-        <p14:creationId xmlns:p14="http://schemas.microsoft.com/office/powerpoint/2010/main" xmlns="" val="1170617722"/>
+        <p14:creationId xmlns="" xmlns:p14="http://schemas.microsoft.com/office/powerpoint/2010/main" val="1170617722"/>
       </p:ext>
     </p:extLst>
   </p:cSld>
@@ -3450,7 +3450,7 @@
           <a:blip r:embed="rId3" cstate="print">
             <a:extLst>
               <a:ext uri="{28A0092B-C50C-407E-A947-70E740481C1C}">
-                <a14:useLocalDpi xmlns:a14="http://schemas.microsoft.com/office/drawing/2010/main" xmlns="" val="0"/>
+                <a14:useLocalDpi xmlns="" xmlns:a14="http://schemas.microsoft.com/office/drawing/2010/main" val="0"/>
               </a:ext>
             </a:extLst>
           </a:blip>
@@ -3460,7 +3460,7 @@
         </p:blipFill>
         <p:spPr>
           <a:xfrm>
-            <a:off x="9518388" y="2643446"/>
+            <a:off x="9518388" y="2501928"/>
             <a:ext cx="774330" cy="860366"/>
           </a:xfrm>
           <a:prstGeom prst="rect">
@@ -3476,7 +3476,7 @@
         </p:nvSpPr>
         <p:spPr>
           <a:xfrm>
-            <a:off x="6524007" y="3132412"/>
+            <a:off x="6524007" y="2990894"/>
             <a:ext cx="1645920" cy="723207"/>
           </a:xfrm>
           <a:prstGeom prst="rect">
@@ -3533,7 +3533,7 @@
         </p:nvSpPr>
         <p:spPr>
           <a:xfrm rot="5400000">
-            <a:off x="10665229" y="3038301"/>
+            <a:off x="10665229" y="2896783"/>
             <a:ext cx="1060704" cy="914400"/>
           </a:xfrm>
           <a:prstGeom prst="triangle">
@@ -3577,7 +3577,7 @@
         </p:nvSpPr>
         <p:spPr>
           <a:xfrm>
-            <a:off x="10508119" y="3310543"/>
+            <a:off x="10508119" y="3169025"/>
             <a:ext cx="282632" cy="270163"/>
           </a:xfrm>
           <a:prstGeom prst="ellipse">
@@ -3621,7 +3621,7 @@
         </p:nvSpPr>
         <p:spPr>
           <a:xfrm>
-            <a:off x="4879258" y="3133896"/>
+            <a:off x="4879258" y="2992378"/>
             <a:ext cx="1645920" cy="723207"/>
           </a:xfrm>
           <a:prstGeom prst="rect">
@@ -3665,7 +3665,7 @@
         </p:nvSpPr>
         <p:spPr>
           <a:xfrm>
-            <a:off x="1448873" y="3073629"/>
+            <a:off x="1448873" y="2932111"/>
             <a:ext cx="1645920" cy="723207"/>
           </a:xfrm>
           <a:prstGeom prst="rect">
@@ -3709,7 +3709,7 @@
         </p:nvSpPr>
         <p:spPr>
           <a:xfrm>
-            <a:off x="1051641" y="3318790"/>
+            <a:off x="1051641" y="3177272"/>
             <a:ext cx="689956" cy="243564"/>
           </a:xfrm>
           <a:prstGeom prst="rect">
@@ -3755,7 +3755,7 @@
         </p:nvSpPr>
         <p:spPr>
           <a:xfrm>
-            <a:off x="886332" y="3325200"/>
+            <a:off x="886332" y="3183682"/>
             <a:ext cx="328672" cy="252384"/>
           </a:xfrm>
           <a:prstGeom prst="rect">
@@ -3802,7 +3802,7 @@
         </p:nvCxnSpPr>
         <p:spPr>
           <a:xfrm>
-            <a:off x="2874541" y="3435232"/>
+            <a:off x="2874541" y="3293714"/>
             <a:ext cx="2104782" cy="0"/>
           </a:xfrm>
           <a:prstGeom prst="line">
@@ -3832,7 +3832,7 @@
         </p:nvSpPr>
         <p:spPr>
           <a:xfrm>
-            <a:off x="4763453" y="3300152"/>
+            <a:off x="4763453" y="3158634"/>
             <a:ext cx="282632" cy="270163"/>
           </a:xfrm>
           <a:prstGeom prst="ellipse">
@@ -3876,7 +3876,7 @@
         </p:nvSpPr>
         <p:spPr>
           <a:xfrm>
-            <a:off x="2959141" y="3300152"/>
+            <a:off x="2959141" y="3158634"/>
             <a:ext cx="282632" cy="270163"/>
           </a:xfrm>
           <a:prstGeom prst="ellipse">
@@ -3920,7 +3920,7 @@
         </p:nvSpPr>
         <p:spPr>
           <a:xfrm>
-            <a:off x="6492075" y="3371501"/>
+            <a:off x="6492075" y="3229983"/>
             <a:ext cx="230175" cy="247995"/>
           </a:xfrm>
           <a:prstGeom prst="ellipse">
@@ -3968,7 +3968,7 @@
           <a:blip r:embed="rId3" cstate="print">
             <a:extLst>
               <a:ext uri="{28A0092B-C50C-407E-A947-70E740481C1C}">
-                <a14:useLocalDpi xmlns:a14="http://schemas.microsoft.com/office/drawing/2010/main" xmlns="" val="0"/>
+                <a14:useLocalDpi xmlns="" xmlns:a14="http://schemas.microsoft.com/office/drawing/2010/main" val="0"/>
               </a:ext>
             </a:extLst>
           </a:blip>
@@ -3978,7 +3978,7 @@
         </p:blipFill>
         <p:spPr>
           <a:xfrm>
-            <a:off x="4671624" y="2629664"/>
+            <a:off x="4671624" y="2488146"/>
             <a:ext cx="436271" cy="524613"/>
           </a:xfrm>
           <a:prstGeom prst="rect">
@@ -3995,7 +3995,7 @@
           <p:nvPr>
             <p:extLst>
               <p:ext uri="{D42A27DB-BD31-4B8C-83A1-F6EECF244321}">
-                <p14:modId xmlns:p14="http://schemas.microsoft.com/office/powerpoint/2010/main" xmlns="" val="2179892277"/>
+                <p14:modId xmlns="" xmlns:p14="http://schemas.microsoft.com/office/powerpoint/2010/main" val="2179892277"/>
               </p:ext>
             </p:extLst>
           </p:nvPr>
@@ -4014,7 +4014,7 @@
                 <a:gridCol w="1868367">
                   <a:extLst>
                     <a:ext uri="{9D8B030D-6E8A-4147-A177-3AD203B41FA5}">
-                      <a16:colId xmlns:a16="http://schemas.microsoft.com/office/drawing/2014/main" xmlns="" val="2749648825"/>
+                      <a16:colId xmlns="" xmlns:a16="http://schemas.microsoft.com/office/drawing/2014/main" val="2749648825"/>
                     </a:ext>
                   </a:extLst>
                 </a:gridCol>
@@ -4036,7 +4036,7 @@
                 </a:tc>
                 <a:extLst>
                   <a:ext uri="{0D108BD9-81ED-4DB2-BD59-A6C34878D82A}">
-                    <a16:rowId xmlns:a16="http://schemas.microsoft.com/office/drawing/2014/main" xmlns="" val="1186927303"/>
+                    <a16:rowId xmlns="" xmlns:a16="http://schemas.microsoft.com/office/drawing/2014/main" val="1186927303"/>
                   </a:ext>
                 </a:extLst>
               </a:tr>
@@ -4057,7 +4057,7 @@
                 </a:tc>
                 <a:extLst>
                   <a:ext uri="{0D108BD9-81ED-4DB2-BD59-A6C34878D82A}">
-                    <a16:rowId xmlns:a16="http://schemas.microsoft.com/office/drawing/2014/main" xmlns="" val="3358398687"/>
+                    <a16:rowId xmlns="" xmlns:a16="http://schemas.microsoft.com/office/drawing/2014/main" val="3358398687"/>
                   </a:ext>
                 </a:extLst>
               </a:tr>
@@ -4078,7 +4078,7 @@
                 </a:tc>
                 <a:extLst>
                   <a:ext uri="{0D108BD9-81ED-4DB2-BD59-A6C34878D82A}">
-                    <a16:rowId xmlns:a16="http://schemas.microsoft.com/office/drawing/2014/main" xmlns="" val="1761697750"/>
+                    <a16:rowId xmlns="" xmlns:a16="http://schemas.microsoft.com/office/drawing/2014/main" val="1761697750"/>
                   </a:ext>
                 </a:extLst>
               </a:tr>
@@ -4103,7 +4103,7 @@
                 </a:tc>
                 <a:extLst>
                   <a:ext uri="{0D108BD9-81ED-4DB2-BD59-A6C34878D82A}">
-                    <a16:rowId xmlns:a16="http://schemas.microsoft.com/office/drawing/2014/main" xmlns="" val="3383609573"/>
+                    <a16:rowId xmlns="" xmlns:a16="http://schemas.microsoft.com/office/drawing/2014/main" val="3383609573"/>
                   </a:ext>
                 </a:extLst>
               </a:tr>
@@ -4124,7 +4124,7 @@
                 </a:tc>
                 <a:extLst>
                   <a:ext uri="{0D108BD9-81ED-4DB2-BD59-A6C34878D82A}">
-                    <a16:rowId xmlns:a16="http://schemas.microsoft.com/office/drawing/2014/main" xmlns="" val="3966298824"/>
+                    <a16:rowId xmlns="" xmlns:a16="http://schemas.microsoft.com/office/drawing/2014/main" val="3966298824"/>
                   </a:ext>
                 </a:extLst>
               </a:tr>
@@ -4149,7 +4149,7 @@
                 </a:tc>
                 <a:extLst>
                   <a:ext uri="{0D108BD9-81ED-4DB2-BD59-A6C34878D82A}">
-                    <a16:rowId xmlns:a16="http://schemas.microsoft.com/office/drawing/2014/main" xmlns="" val="1041985094"/>
+                    <a16:rowId xmlns="" xmlns:a16="http://schemas.microsoft.com/office/drawing/2014/main" val="1041985094"/>
                   </a:ext>
                 </a:extLst>
               </a:tr>
@@ -4170,7 +4170,7 @@
                 </a:tc>
                 <a:extLst>
                   <a:ext uri="{0D108BD9-81ED-4DB2-BD59-A6C34878D82A}">
-                    <a16:rowId xmlns:a16="http://schemas.microsoft.com/office/drawing/2014/main" xmlns="" val="392577592"/>
+                    <a16:rowId xmlns="" xmlns:a16="http://schemas.microsoft.com/office/drawing/2014/main" val="392577592"/>
                   </a:ext>
                 </a:extLst>
               </a:tr>
@@ -4191,7 +4191,7 @@
                 </a:tc>
                 <a:extLst>
                   <a:ext uri="{0D108BD9-81ED-4DB2-BD59-A6C34878D82A}">
-                    <a16:rowId xmlns:a16="http://schemas.microsoft.com/office/drawing/2014/main" xmlns="" val="3196274515"/>
+                    <a16:rowId xmlns="" xmlns:a16="http://schemas.microsoft.com/office/drawing/2014/main" val="3196274515"/>
                   </a:ext>
                 </a:extLst>
               </a:tr>
@@ -4208,7 +4208,7 @@
           <p:nvPr>
             <p:extLst>
               <p:ext uri="{D42A27DB-BD31-4B8C-83A1-F6EECF244321}">
-                <p14:modId xmlns:p14="http://schemas.microsoft.com/office/powerpoint/2010/main" xmlns="" val="3376360791"/>
+                <p14:modId xmlns="" xmlns:p14="http://schemas.microsoft.com/office/powerpoint/2010/main" val="3376360791"/>
               </p:ext>
             </p:extLst>
           </p:nvPr>
@@ -4227,7 +4227,7 @@
                 <a:gridCol w="1813625">
                   <a:extLst>
                     <a:ext uri="{9D8B030D-6E8A-4147-A177-3AD203B41FA5}">
-                      <a16:colId xmlns:a16="http://schemas.microsoft.com/office/drawing/2014/main" xmlns="" val="2749648825"/>
+                      <a16:colId xmlns="" xmlns:a16="http://schemas.microsoft.com/office/drawing/2014/main" val="2749648825"/>
                     </a:ext>
                   </a:extLst>
                 </a:gridCol>
@@ -4249,7 +4249,7 @@
                 </a:tc>
                 <a:extLst>
                   <a:ext uri="{0D108BD9-81ED-4DB2-BD59-A6C34878D82A}">
-                    <a16:rowId xmlns:a16="http://schemas.microsoft.com/office/drawing/2014/main" xmlns="" val="1186927303"/>
+                    <a16:rowId xmlns="" xmlns:a16="http://schemas.microsoft.com/office/drawing/2014/main" val="1186927303"/>
                   </a:ext>
                 </a:extLst>
               </a:tr>
@@ -4282,7 +4282,7 @@
                 </a:tc>
                 <a:extLst>
                   <a:ext uri="{0D108BD9-81ED-4DB2-BD59-A6C34878D82A}">
-                    <a16:rowId xmlns:a16="http://schemas.microsoft.com/office/drawing/2014/main" xmlns="" val="10002"/>
+                    <a16:rowId xmlns="" xmlns:a16="http://schemas.microsoft.com/office/drawing/2014/main" val="10002"/>
                   </a:ext>
                 </a:extLst>
               </a:tr>
@@ -4327,7 +4327,7 @@
                 </a:tc>
                 <a:extLst>
                   <a:ext uri="{0D108BD9-81ED-4DB2-BD59-A6C34878D82A}">
-                    <a16:rowId xmlns:a16="http://schemas.microsoft.com/office/drawing/2014/main" xmlns="" val="1681777418"/>
+                    <a16:rowId xmlns="" xmlns:a16="http://schemas.microsoft.com/office/drawing/2014/main" val="1681777418"/>
                   </a:ext>
                 </a:extLst>
               </a:tr>
@@ -4356,7 +4356,7 @@
                 </a:tc>
                 <a:extLst>
                   <a:ext uri="{0D108BD9-81ED-4DB2-BD59-A6C34878D82A}">
-                    <a16:rowId xmlns:a16="http://schemas.microsoft.com/office/drawing/2014/main" xmlns="" val="1761697750"/>
+                    <a16:rowId xmlns="" xmlns:a16="http://schemas.microsoft.com/office/drawing/2014/main" val="1761697750"/>
                   </a:ext>
                 </a:extLst>
               </a:tr>
@@ -4381,7 +4381,7 @@
                 </a:tc>
                 <a:extLst>
                   <a:ext uri="{0D108BD9-81ED-4DB2-BD59-A6C34878D82A}">
-                    <a16:rowId xmlns:a16="http://schemas.microsoft.com/office/drawing/2014/main" xmlns="" val="582597117"/>
+                    <a16:rowId xmlns="" xmlns:a16="http://schemas.microsoft.com/office/drawing/2014/main" val="582597117"/>
                   </a:ext>
                 </a:extLst>
               </a:tr>
@@ -4412,7 +4412,7 @@
                 </a:tc>
                 <a:extLst>
                   <a:ext uri="{0D108BD9-81ED-4DB2-BD59-A6C34878D82A}">
-                    <a16:rowId xmlns:a16="http://schemas.microsoft.com/office/drawing/2014/main" xmlns="" val="3448361831"/>
+                    <a16:rowId xmlns="" xmlns:a16="http://schemas.microsoft.com/office/drawing/2014/main" val="3448361831"/>
                   </a:ext>
                 </a:extLst>
               </a:tr>
@@ -4429,7 +4429,7 @@
           <p:nvPr>
             <p:extLst>
               <p:ext uri="{D42A27DB-BD31-4B8C-83A1-F6EECF244321}">
-                <p14:modId xmlns:p14="http://schemas.microsoft.com/office/powerpoint/2010/main" xmlns="" val="3729796579"/>
+                <p14:modId xmlns="" xmlns:p14="http://schemas.microsoft.com/office/powerpoint/2010/main" val="3729796579"/>
               </p:ext>
             </p:extLst>
           </p:nvPr>
@@ -4448,7 +4448,7 @@
                 <a:gridCol w="2667309">
                   <a:extLst>
                     <a:ext uri="{9D8B030D-6E8A-4147-A177-3AD203B41FA5}">
-                      <a16:colId xmlns:a16="http://schemas.microsoft.com/office/drawing/2014/main" xmlns="" val="2749648825"/>
+                      <a16:colId xmlns="" xmlns:a16="http://schemas.microsoft.com/office/drawing/2014/main" val="2749648825"/>
                     </a:ext>
                   </a:extLst>
                 </a:gridCol>
@@ -4470,7 +4470,7 @@
                 </a:tc>
                 <a:extLst>
                   <a:ext uri="{0D108BD9-81ED-4DB2-BD59-A6C34878D82A}">
-                    <a16:rowId xmlns:a16="http://schemas.microsoft.com/office/drawing/2014/main" xmlns="" val="1186927303"/>
+                    <a16:rowId xmlns="" xmlns:a16="http://schemas.microsoft.com/office/drawing/2014/main" val="1186927303"/>
                   </a:ext>
                 </a:extLst>
               </a:tr>
@@ -4512,7 +4512,7 @@
                 </a:tc>
                 <a:extLst>
                   <a:ext uri="{0D108BD9-81ED-4DB2-BD59-A6C34878D82A}">
-                    <a16:rowId xmlns:a16="http://schemas.microsoft.com/office/drawing/2014/main" xmlns="" val="2827937352"/>
+                    <a16:rowId xmlns="" xmlns:a16="http://schemas.microsoft.com/office/drawing/2014/main" val="2827937352"/>
                   </a:ext>
                 </a:extLst>
               </a:tr>
@@ -4533,7 +4533,7 @@
                 </a:tc>
                 <a:extLst>
                   <a:ext uri="{0D108BD9-81ED-4DB2-BD59-A6C34878D82A}">
-                    <a16:rowId xmlns:a16="http://schemas.microsoft.com/office/drawing/2014/main" xmlns="" val="3358398687"/>
+                    <a16:rowId xmlns="" xmlns:a16="http://schemas.microsoft.com/office/drawing/2014/main" val="3358398687"/>
                   </a:ext>
                 </a:extLst>
               </a:tr>
@@ -4570,7 +4570,7 @@
                 </a:tc>
                 <a:extLst>
                   <a:ext uri="{0D108BD9-81ED-4DB2-BD59-A6C34878D82A}">
-                    <a16:rowId xmlns:a16="http://schemas.microsoft.com/office/drawing/2014/main" xmlns="" val="1761697750"/>
+                    <a16:rowId xmlns="" xmlns:a16="http://schemas.microsoft.com/office/drawing/2014/main" val="1761697750"/>
                   </a:ext>
                 </a:extLst>
               </a:tr>
@@ -4595,7 +4595,7 @@
                 </a:tc>
                 <a:extLst>
                   <a:ext uri="{0D108BD9-81ED-4DB2-BD59-A6C34878D82A}">
-                    <a16:rowId xmlns:a16="http://schemas.microsoft.com/office/drawing/2014/main" xmlns="" val="3966298824"/>
+                    <a16:rowId xmlns="" xmlns:a16="http://schemas.microsoft.com/office/drawing/2014/main" val="3966298824"/>
                   </a:ext>
                 </a:extLst>
               </a:tr>
@@ -4624,7 +4624,7 @@
                 </a:tc>
                 <a:extLst>
                   <a:ext uri="{0D108BD9-81ED-4DB2-BD59-A6C34878D82A}">
-                    <a16:rowId xmlns:a16="http://schemas.microsoft.com/office/drawing/2014/main" xmlns="" val="1665772014"/>
+                    <a16:rowId xmlns="" xmlns:a16="http://schemas.microsoft.com/office/drawing/2014/main" val="1665772014"/>
                   </a:ext>
                 </a:extLst>
               </a:tr>
@@ -4645,7 +4645,7 @@
                 </a:tc>
                 <a:extLst>
                   <a:ext uri="{0D108BD9-81ED-4DB2-BD59-A6C34878D82A}">
-                    <a16:rowId xmlns:a16="http://schemas.microsoft.com/office/drawing/2014/main" xmlns="" val="1911882416"/>
+                    <a16:rowId xmlns="" xmlns:a16="http://schemas.microsoft.com/office/drawing/2014/main" val="1911882416"/>
                   </a:ext>
                 </a:extLst>
               </a:tr>
@@ -4662,7 +4662,7 @@
           <p:nvPr>
             <p:extLst>
               <p:ext uri="{D42A27DB-BD31-4B8C-83A1-F6EECF244321}">
-                <p14:modId xmlns:p14="http://schemas.microsoft.com/office/powerpoint/2010/main" xmlns="" val="2848375722"/>
+                <p14:modId xmlns="" xmlns:p14="http://schemas.microsoft.com/office/powerpoint/2010/main" val="2848375722"/>
               </p:ext>
             </p:extLst>
           </p:nvPr>
@@ -4681,7 +4681,7 @@
                 <a:gridCol w="1687021">
                   <a:extLst>
                     <a:ext uri="{9D8B030D-6E8A-4147-A177-3AD203B41FA5}">
-                      <a16:colId xmlns:a16="http://schemas.microsoft.com/office/drawing/2014/main" xmlns="" val="2749648825"/>
+                      <a16:colId xmlns="" xmlns:a16="http://schemas.microsoft.com/office/drawing/2014/main" val="2749648825"/>
                     </a:ext>
                   </a:extLst>
                 </a:gridCol>
@@ -4703,7 +4703,7 @@
                 </a:tc>
                 <a:extLst>
                   <a:ext uri="{0D108BD9-81ED-4DB2-BD59-A6C34878D82A}">
-                    <a16:rowId xmlns:a16="http://schemas.microsoft.com/office/drawing/2014/main" xmlns="" val="1186927303"/>
+                    <a16:rowId xmlns="" xmlns:a16="http://schemas.microsoft.com/office/drawing/2014/main" val="1186927303"/>
                   </a:ext>
                 </a:extLst>
               </a:tr>
@@ -4732,7 +4732,7 @@
                 </a:tc>
                 <a:extLst>
                   <a:ext uri="{0D108BD9-81ED-4DB2-BD59-A6C34878D82A}">
-                    <a16:rowId xmlns:a16="http://schemas.microsoft.com/office/drawing/2014/main" xmlns="" val="3358398687"/>
+                    <a16:rowId xmlns="" xmlns:a16="http://schemas.microsoft.com/office/drawing/2014/main" val="3358398687"/>
                   </a:ext>
                 </a:extLst>
               </a:tr>
@@ -4769,7 +4769,7 @@
                 </a:tc>
                 <a:extLst>
                   <a:ext uri="{0D108BD9-81ED-4DB2-BD59-A6C34878D82A}">
-                    <a16:rowId xmlns:a16="http://schemas.microsoft.com/office/drawing/2014/main" xmlns="" val="1761697750"/>
+                    <a16:rowId xmlns="" xmlns:a16="http://schemas.microsoft.com/office/drawing/2014/main" val="1761697750"/>
                   </a:ext>
                 </a:extLst>
               </a:tr>
@@ -4794,7 +4794,7 @@
                 </a:tc>
                 <a:extLst>
                   <a:ext uri="{0D108BD9-81ED-4DB2-BD59-A6C34878D82A}">
-                    <a16:rowId xmlns:a16="http://schemas.microsoft.com/office/drawing/2014/main" xmlns="" val="3383609573"/>
+                    <a16:rowId xmlns="" xmlns:a16="http://schemas.microsoft.com/office/drawing/2014/main" val="3383609573"/>
                   </a:ext>
                 </a:extLst>
               </a:tr>
@@ -4815,7 +4815,7 @@
                 </a:tc>
                 <a:extLst>
                   <a:ext uri="{0D108BD9-81ED-4DB2-BD59-A6C34878D82A}">
-                    <a16:rowId xmlns:a16="http://schemas.microsoft.com/office/drawing/2014/main" xmlns="" val="3966298824"/>
+                    <a16:rowId xmlns="" xmlns:a16="http://schemas.microsoft.com/office/drawing/2014/main" val="3966298824"/>
                   </a:ext>
                 </a:extLst>
               </a:tr>
@@ -4860,7 +4860,7 @@
                 </a:tc>
                 <a:extLst>
                   <a:ext uri="{0D108BD9-81ED-4DB2-BD59-A6C34878D82A}">
-                    <a16:rowId xmlns:a16="http://schemas.microsoft.com/office/drawing/2014/main" xmlns="" val="2497034091"/>
+                    <a16:rowId xmlns="" xmlns:a16="http://schemas.microsoft.com/office/drawing/2014/main" val="2497034091"/>
                   </a:ext>
                 </a:extLst>
               </a:tr>
@@ -4877,14 +4877,14 @@
           <p:nvPr>
             <p:extLst>
               <p:ext uri="{D42A27DB-BD31-4B8C-83A1-F6EECF244321}">
-                <p14:modId xmlns:p14="http://schemas.microsoft.com/office/powerpoint/2010/main" xmlns="" val="2363931275"/>
+                <p14:modId xmlns="" xmlns:p14="http://schemas.microsoft.com/office/powerpoint/2010/main" val="2363931275"/>
               </p:ext>
             </p:extLst>
           </p:nvPr>
         </p:nvGraphicFramePr>
         <p:xfrm>
-          <a:off x="4021133" y="3919084"/>
-          <a:ext cx="1945717" cy="1036320"/>
+          <a:off x="4032018" y="3712256"/>
+          <a:ext cx="1945717" cy="1295400"/>
         </p:xfrm>
         <a:graphic>
           <a:graphicData uri="http://schemas.openxmlformats.org/drawingml/2006/table">
@@ -4896,7 +4896,7 @@
                 <a:gridCol w="1945717">
                   <a:extLst>
                     <a:ext uri="{9D8B030D-6E8A-4147-A177-3AD203B41FA5}">
-                      <a16:colId xmlns:a16="http://schemas.microsoft.com/office/drawing/2014/main" xmlns="" val="2749648825"/>
+                      <a16:colId xmlns="" xmlns:a16="http://schemas.microsoft.com/office/drawing/2014/main" val="2749648825"/>
                     </a:ext>
                   </a:extLst>
                 </a:gridCol>
@@ -4909,11 +4909,7 @@
                     <a:p>
                       <a:r>
                         <a:rPr lang="en-US" sz="1100" b="1" dirty="0" smtClean="0"/>
-                        <a:t>Proton </a:t>
-                      </a:r>
-                      <a:r>
-                        <a:rPr lang="en-US" sz="1100" b="1" dirty="0" smtClean="0"/>
-                        <a:t>26923C</a:t>
+                        <a:t>Raven</a:t>
                       </a:r>
                       <a:endParaRPr lang="en-US" sz="1100" b="1" dirty="0"/>
                     </a:p>
@@ -4922,7 +4918,7 @@
                 </a:tc>
                 <a:extLst>
                   <a:ext uri="{0D108BD9-81ED-4DB2-BD59-A6C34878D82A}">
-                    <a16:rowId xmlns:a16="http://schemas.microsoft.com/office/drawing/2014/main" xmlns="" val="1186927303"/>
+                    <a16:rowId xmlns="" xmlns:a16="http://schemas.microsoft.com/office/drawing/2014/main" val="1186927303"/>
                   </a:ext>
                 </a:extLst>
               </a:tr>
@@ -4934,11 +4930,7 @@
                     <a:p>
                       <a:r>
                         <a:rPr lang="en-US" sz="1100" b="1" dirty="0" smtClean="0"/>
-                        <a:t>CH 1  Apogee +</a:t>
-                      </a:r>
-                      <a:r>
-                        <a:rPr lang="en-US" sz="1100" b="1" baseline="0" dirty="0" smtClean="0"/>
-                        <a:t> 1 sec</a:t>
+                        <a:t>CH 1  Apogee </a:t>
                       </a:r>
                       <a:endParaRPr lang="en-US" sz="1100" b="1" dirty="0"/>
                     </a:p>
@@ -4947,7 +4939,7 @@
                 </a:tc>
                 <a:extLst>
                   <a:ext uri="{0D108BD9-81ED-4DB2-BD59-A6C34878D82A}">
-                    <a16:rowId xmlns:a16="http://schemas.microsoft.com/office/drawing/2014/main" xmlns="" val="3358398687"/>
+                    <a16:rowId xmlns="" xmlns:a16="http://schemas.microsoft.com/office/drawing/2014/main" val="3358398687"/>
                   </a:ext>
                 </a:extLst>
               </a:tr>
@@ -4959,7 +4951,7 @@
                     <a:p>
                       <a:r>
                         <a:rPr lang="en-US" sz="1100" b="1" dirty="0" smtClean="0"/>
-                        <a:t>Ch 3 Main 700 CO2  (dual)</a:t>
+                        <a:t>Ch 2 Main 672 CO2  (dual)</a:t>
                       </a:r>
                       <a:endParaRPr lang="en-US" sz="1100" b="1" dirty="0"/>
                     </a:p>
@@ -4968,7 +4960,7 @@
                 </a:tc>
                 <a:extLst>
                   <a:ext uri="{0D108BD9-81ED-4DB2-BD59-A6C34878D82A}">
-                    <a16:rowId xmlns:a16="http://schemas.microsoft.com/office/drawing/2014/main" xmlns="" val="10002"/>
+                    <a16:rowId xmlns="" xmlns:a16="http://schemas.microsoft.com/office/drawing/2014/main" val="10002"/>
                   </a:ext>
                 </a:extLst>
               </a:tr>
@@ -4980,7 +4972,7 @@
                     <a:p>
                       <a:r>
                         <a:rPr lang="en-US" sz="1100" b="1" dirty="0" smtClean="0"/>
-                        <a:t>Ch 6 Main 600</a:t>
+                        <a:t>Ch 3 Apogee + 2</a:t>
                       </a:r>
                       <a:endParaRPr lang="en-US" sz="1100" b="1" dirty="0"/>
                     </a:p>
@@ -4989,9 +4981,25 @@
                 </a:tc>
                 <a:extLst>
                   <a:ext uri="{0D108BD9-81ED-4DB2-BD59-A6C34878D82A}">
-                    <a16:rowId xmlns:a16="http://schemas.microsoft.com/office/drawing/2014/main" xmlns="" val="10003"/>
+                    <a16:rowId xmlns="" xmlns:a16="http://schemas.microsoft.com/office/drawing/2014/main" val="10003"/>
                   </a:ext>
                 </a:extLst>
+              </a:tr>
+              <a:tr h="203588">
+                <a:tc>
+                  <a:txBody>
+                    <a:bodyPr/>
+                    <a:lstStyle/>
+                    <a:p>
+                      <a:r>
+                        <a:rPr lang="en-US" sz="1100" b="1" dirty="0" smtClean="0"/>
+                        <a:t>Ch 4 Main 480</a:t>
+                      </a:r>
+                      <a:endParaRPr lang="en-US" sz="1100" b="1" dirty="0"/>
+                    </a:p>
+                  </a:txBody>
+                  <a:tcPr/>
+                </a:tc>
               </a:tr>
             </a:tbl>
           </a:graphicData>
@@ -5006,7 +5014,7 @@
           <p:nvPr>
             <p:extLst>
               <p:ext uri="{D42A27DB-BD31-4B8C-83A1-F6EECF244321}">
-                <p14:modId xmlns:p14="http://schemas.microsoft.com/office/powerpoint/2010/main" xmlns="" val="1487404572"/>
+                <p14:modId xmlns="" xmlns:p14="http://schemas.microsoft.com/office/powerpoint/2010/main" val="1487404572"/>
               </p:ext>
             </p:extLst>
           </p:nvPr>
@@ -5025,7 +5033,7 @@
                 <a:gridCol w="1994536">
                   <a:extLst>
                     <a:ext uri="{9D8B030D-6E8A-4147-A177-3AD203B41FA5}">
-                      <a16:colId xmlns:a16="http://schemas.microsoft.com/office/drawing/2014/main" xmlns="" val="2749648825"/>
+                      <a16:colId xmlns="" xmlns:a16="http://schemas.microsoft.com/office/drawing/2014/main" val="2749648825"/>
                     </a:ext>
                   </a:extLst>
                 </a:gridCol>
@@ -5038,11 +5046,11 @@
                     <a:p>
                       <a:r>
                         <a:rPr lang="en-US" sz="1100" b="1" dirty="0" smtClean="0"/>
-                        <a:t>Quantum </a:t>
-                      </a:r>
-                      <a:r>
-                        <a:rPr lang="en-US" sz="1100" b="1" dirty="0" smtClean="0"/>
-                        <a:t>5B8D2B</a:t>
+                        <a:t>Quantum 5B8D2B  1844</a:t>
+                      </a:r>
+                      <a:r>
+                        <a:rPr lang="en-US" sz="1100" b="1" baseline="0" dirty="0" smtClean="0"/>
+                        <a:t>  8245</a:t>
                       </a:r>
                       <a:endParaRPr lang="en-US" sz="1100" b="1" dirty="0"/>
                     </a:p>
@@ -5051,7 +5059,7 @@
                 </a:tc>
                 <a:extLst>
                   <a:ext uri="{0D108BD9-81ED-4DB2-BD59-A6C34878D82A}">
-                    <a16:rowId xmlns:a16="http://schemas.microsoft.com/office/drawing/2014/main" xmlns="" val="1186927303"/>
+                    <a16:rowId xmlns="" xmlns:a16="http://schemas.microsoft.com/office/drawing/2014/main" val="1186927303"/>
                   </a:ext>
                 </a:extLst>
               </a:tr>
@@ -5063,7 +5071,7 @@
                     <a:p>
                       <a:r>
                         <a:rPr lang="en-US" sz="1100" b="1" dirty="0" smtClean="0"/>
-                        <a:t>CH D Apogee</a:t>
+                        <a:t>CH D Apogee + 1s</a:t>
                       </a:r>
                       <a:endParaRPr lang="en-US" sz="1100" b="1" dirty="0"/>
                     </a:p>
@@ -5072,7 +5080,7 @@
                 </a:tc>
                 <a:extLst>
                   <a:ext uri="{0D108BD9-81ED-4DB2-BD59-A6C34878D82A}">
-                    <a16:rowId xmlns:a16="http://schemas.microsoft.com/office/drawing/2014/main" xmlns="" val="3358398687"/>
+                    <a16:rowId xmlns="" xmlns:a16="http://schemas.microsoft.com/office/drawing/2014/main" val="3358398687"/>
                   </a:ext>
                 </a:extLst>
               </a:tr>
@@ -5109,7 +5117,7 @@
                 </a:tc>
                 <a:extLst>
                   <a:ext uri="{0D108BD9-81ED-4DB2-BD59-A6C34878D82A}">
-                    <a16:rowId xmlns:a16="http://schemas.microsoft.com/office/drawing/2014/main" xmlns="" val="1761697750"/>
+                    <a16:rowId xmlns="" xmlns:a16="http://schemas.microsoft.com/office/drawing/2014/main" val="1761697750"/>
                   </a:ext>
                 </a:extLst>
               </a:tr>
@@ -5125,7 +5133,7 @@
         </p:nvSpPr>
         <p:spPr>
           <a:xfrm>
-            <a:off x="9664608" y="3427272"/>
+            <a:off x="9664608" y="3285754"/>
             <a:ext cx="282632" cy="270163"/>
           </a:xfrm>
           <a:prstGeom prst="ellipse">
@@ -5169,7 +5177,7 @@
         </p:nvSpPr>
         <p:spPr>
           <a:xfrm>
-            <a:off x="652110" y="3294303"/>
+            <a:off x="652110" y="3152785"/>
             <a:ext cx="233190" cy="283281"/>
           </a:xfrm>
           <a:prstGeom prst="rect">
@@ -5254,7 +5262,7 @@
         </p:nvSpPr>
         <p:spPr>
           <a:xfrm>
-            <a:off x="9372394" y="2085760"/>
+            <a:off x="9426822" y="1933360"/>
             <a:ext cx="1066318" cy="584775"/>
           </a:xfrm>
           <a:prstGeom prst="rect">
@@ -5292,7 +5300,7 @@
         </p:nvSpPr>
         <p:spPr>
           <a:xfrm>
-            <a:off x="3959025" y="2140085"/>
+            <a:off x="3959025" y="1998567"/>
             <a:ext cx="1425198" cy="584775"/>
           </a:xfrm>
           <a:prstGeom prst="rect">
@@ -5332,7 +5340,7 @@
         </p:nvCxnSpPr>
         <p:spPr>
           <a:xfrm>
-            <a:off x="8155668" y="3522895"/>
+            <a:off x="8155668" y="3381377"/>
             <a:ext cx="2593693" cy="18247"/>
           </a:xfrm>
           <a:prstGeom prst="line">
@@ -5363,7 +5371,7 @@
           <p:nvPr>
             <p:extLst>
               <p:ext uri="{D42A27DB-BD31-4B8C-83A1-F6EECF244321}">
-                <p14:modId xmlns:p14="http://schemas.microsoft.com/office/powerpoint/2010/main" xmlns="" val="1225392099"/>
+                <p14:modId xmlns="" xmlns:p14="http://schemas.microsoft.com/office/powerpoint/2010/main" val="1225392099"/>
               </p:ext>
             </p:extLst>
           </p:nvPr>
@@ -5382,7 +5390,7 @@
                 <a:gridCol w="1687021">
                   <a:extLst>
                     <a:ext uri="{9D8B030D-6E8A-4147-A177-3AD203B41FA5}">
-                      <a16:colId xmlns:a16="http://schemas.microsoft.com/office/drawing/2014/main" xmlns="" val="2749648825"/>
+                      <a16:colId xmlns="" xmlns:a16="http://schemas.microsoft.com/office/drawing/2014/main" val="2749648825"/>
                     </a:ext>
                   </a:extLst>
                 </a:gridCol>
@@ -5404,7 +5412,7 @@
                 </a:tc>
                 <a:extLst>
                   <a:ext uri="{0D108BD9-81ED-4DB2-BD59-A6C34878D82A}">
-                    <a16:rowId xmlns:a16="http://schemas.microsoft.com/office/drawing/2014/main" xmlns="" val="1186927303"/>
+                    <a16:rowId xmlns="" xmlns:a16="http://schemas.microsoft.com/office/drawing/2014/main" val="1186927303"/>
                   </a:ext>
                 </a:extLst>
               </a:tr>
@@ -5425,7 +5433,7 @@
                 </a:tc>
                 <a:extLst>
                   <a:ext uri="{0D108BD9-81ED-4DB2-BD59-A6C34878D82A}">
-                    <a16:rowId xmlns:a16="http://schemas.microsoft.com/office/drawing/2014/main" xmlns="" val="3966298824"/>
+                    <a16:rowId xmlns="" xmlns:a16="http://schemas.microsoft.com/office/drawing/2014/main" val="3966298824"/>
                   </a:ext>
                 </a:extLst>
               </a:tr>
@@ -5462,7 +5470,7 @@
                 </a:tc>
                 <a:extLst>
                   <a:ext uri="{0D108BD9-81ED-4DB2-BD59-A6C34878D82A}">
-                    <a16:rowId xmlns:a16="http://schemas.microsoft.com/office/drawing/2014/main" xmlns="" val="2201266787"/>
+                    <a16:rowId xmlns="" xmlns:a16="http://schemas.microsoft.com/office/drawing/2014/main" val="2201266787"/>
                   </a:ext>
                 </a:extLst>
               </a:tr>
@@ -5479,7 +5487,7 @@
           <p:nvPr>
             <p:extLst>
               <p:ext uri="{D42A27DB-BD31-4B8C-83A1-F6EECF244321}">
-                <p14:modId xmlns:p14="http://schemas.microsoft.com/office/powerpoint/2010/main" xmlns="" val="1238150250"/>
+                <p14:modId xmlns="" xmlns:p14="http://schemas.microsoft.com/office/powerpoint/2010/main" val="1238150250"/>
               </p:ext>
             </p:extLst>
           </p:nvPr>
@@ -5498,7 +5506,7 @@
                 <a:gridCol w="1964866">
                   <a:extLst>
                     <a:ext uri="{9D8B030D-6E8A-4147-A177-3AD203B41FA5}">
-                      <a16:colId xmlns:a16="http://schemas.microsoft.com/office/drawing/2014/main" xmlns="" val="2749648825"/>
+                      <a16:colId xmlns="" xmlns:a16="http://schemas.microsoft.com/office/drawing/2014/main" val="2749648825"/>
                     </a:ext>
                   </a:extLst>
                 </a:gridCol>
@@ -5518,8 +5526,12 @@
                         <a:t>, </a:t>
                       </a:r>
                       <a:r>
+                        <a:rPr lang="en-US" sz="1200" b="1" baseline="0" dirty="0" err="1" smtClean="0"/>
+                        <a:t>Ch</a:t>
+                      </a:r>
+                      <a:r>
                         <a:rPr lang="en-US" sz="1200" b="1" baseline="0" dirty="0" smtClean="0"/>
-                        <a:t>Ch</a:t>
+                        <a:t> 8 435.35</a:t>
                       </a:r>
                       <a:endParaRPr lang="en-US" sz="1200" b="1" dirty="0"/>
                     </a:p>
@@ -5528,7 +5540,7 @@
                 </a:tc>
                 <a:extLst>
                   <a:ext uri="{0D108BD9-81ED-4DB2-BD59-A6C34878D82A}">
-                    <a16:rowId xmlns:a16="http://schemas.microsoft.com/office/drawing/2014/main" xmlns="" val="1186927303"/>
+                    <a16:rowId xmlns="" xmlns:a16="http://schemas.microsoft.com/office/drawing/2014/main" val="1186927303"/>
                   </a:ext>
                 </a:extLst>
               </a:tr>
@@ -5549,7 +5561,7 @@
                 </a:tc>
                 <a:extLst>
                   <a:ext uri="{0D108BD9-81ED-4DB2-BD59-A6C34878D82A}">
-                    <a16:rowId xmlns:a16="http://schemas.microsoft.com/office/drawing/2014/main" xmlns="" val="3358398687"/>
+                    <a16:rowId xmlns="" xmlns:a16="http://schemas.microsoft.com/office/drawing/2014/main" val="3358398687"/>
                   </a:ext>
                 </a:extLst>
               </a:tr>
@@ -5586,7 +5598,7 @@
                 </a:tc>
                 <a:extLst>
                   <a:ext uri="{0D108BD9-81ED-4DB2-BD59-A6C34878D82A}">
-                    <a16:rowId xmlns:a16="http://schemas.microsoft.com/office/drawing/2014/main" xmlns="" val="1761697750"/>
+                    <a16:rowId xmlns="" xmlns:a16="http://schemas.microsoft.com/office/drawing/2014/main" val="1761697750"/>
                   </a:ext>
                 </a:extLst>
               </a:tr>
@@ -5602,7 +5614,7 @@
         </p:nvSpPr>
         <p:spPr>
           <a:xfrm>
-            <a:off x="4556369" y="3073629"/>
+            <a:off x="4556369" y="2932111"/>
             <a:ext cx="551526" cy="251571"/>
           </a:xfrm>
           <a:prstGeom prst="rect">
@@ -5651,7 +5663,7 @@
         </p:nvSpPr>
         <p:spPr>
           <a:xfrm>
-            <a:off x="9561023" y="3211776"/>
+            <a:off x="9561023" y="3070258"/>
             <a:ext cx="551526" cy="251571"/>
           </a:xfrm>
           <a:prstGeom prst="rect">
@@ -5700,7 +5712,7 @@
         </p:nvSpPr>
         <p:spPr>
           <a:xfrm>
-            <a:off x="10067048" y="3455253"/>
+            <a:off x="10067048" y="3313735"/>
             <a:ext cx="551526" cy="251571"/>
           </a:xfrm>
           <a:prstGeom prst="rect">
@@ -5748,7 +5760,7 @@
           <p:nvPr>
             <p:extLst>
               <p:ext uri="{D42A27DB-BD31-4B8C-83A1-F6EECF244321}">
-                <p14:modId xmlns:p14="http://schemas.microsoft.com/office/powerpoint/2010/main" xmlns="" val="1051959780"/>
+                <p14:modId xmlns="" xmlns:p14="http://schemas.microsoft.com/office/powerpoint/2010/main" val="1051959780"/>
               </p:ext>
             </p:extLst>
           </p:nvPr>
@@ -5767,7 +5779,7 @@
                 <a:gridCol w="1964866">
                   <a:extLst>
                     <a:ext uri="{9D8B030D-6E8A-4147-A177-3AD203B41FA5}">
-                      <a16:colId xmlns:a16="http://schemas.microsoft.com/office/drawing/2014/main" xmlns="" val="2749648825"/>
+                      <a16:colId xmlns="" xmlns:a16="http://schemas.microsoft.com/office/drawing/2014/main" val="2749648825"/>
                     </a:ext>
                   </a:extLst>
                 </a:gridCol>
@@ -5787,12 +5799,8 @@
                         <a:t>Wifi</a:t>
                       </a:r>
                       <a:r>
-                        <a:rPr lang="en-US" sz="1200" b="1" baseline="0" dirty="0" smtClean="0"/>
-                        <a:t> </a:t>
-                      </a:r>
-                      <a:r>
-                        <a:rPr lang="en-US" sz="1200" b="1" baseline="0" dirty="0" smtClean="0"/>
-                        <a:t>1C7C0</a:t>
+                        <a:rPr lang="en-US" sz="1200" b="1" baseline="0" smtClean="0"/>
+                        <a:t> 1C7C0  8383 0360</a:t>
                       </a:r>
                       <a:endParaRPr lang="en-US" sz="1200" b="1" dirty="0"/>
                     </a:p>
@@ -5801,7 +5809,7 @@
                 </a:tc>
                 <a:extLst>
                   <a:ext uri="{0D108BD9-81ED-4DB2-BD59-A6C34878D82A}">
-                    <a16:rowId xmlns:a16="http://schemas.microsoft.com/office/drawing/2014/main" xmlns="" val="1186927303"/>
+                    <a16:rowId xmlns="" xmlns:a16="http://schemas.microsoft.com/office/drawing/2014/main" val="1186927303"/>
                   </a:ext>
                 </a:extLst>
               </a:tr>
@@ -5812,7 +5820,7 @@
     </p:spTree>
     <p:extLst>
       <p:ext uri="{BB962C8B-B14F-4D97-AF65-F5344CB8AC3E}">
-        <p14:creationId xmlns:p14="http://schemas.microsoft.com/office/powerpoint/2010/main" xmlns="" val="582383660"/>
+        <p14:creationId xmlns="" xmlns:p14="http://schemas.microsoft.com/office/powerpoint/2010/main" val="582383660"/>
       </p:ext>
     </p:extLst>
   </p:cSld>
@@ -6077,7 +6085,7 @@
   <a:extraClrSchemeLst/>
   <a:extLst>
     <a:ext uri="{05A4C25C-085E-4340-85A3-A5531E510DB2}">
-      <thm15:themeFamily xmlns:thm15="http://schemas.microsoft.com/office/thememl/2012/main" xmlns="" name="Office Theme" id="{62F939B6-93AF-4DB8-9C6B-D6C7DFDC589F}" vid="{4A3C46E8-61CC-4603-A589-7422A47A8E4A}"/>
+      <thm15:themeFamily xmlns="" xmlns:thm15="http://schemas.microsoft.com/office/thememl/2012/main" name="Office Theme" id="{62F939B6-93AF-4DB8-9C6B-D6C7DFDC589F}" vid="{4A3C46E8-61CC-4603-A589-7422A47A8E4A}"/>
     </a:ext>
   </a:extLst>
 </a:theme>

</xml_diff>

<commit_message>
Added color codes to visual check list
</commit_message>
<xml_diff>
--- a/4inin L3 redo Visual Checklist  20191122.pptx
+++ b/4inin L3 redo Visual Checklist  20191122.pptx
@@ -109,7 +109,7 @@
   </p:defaultTextStyle>
   <p:extLst>
     <p:ext uri="{EFAFB233-063F-42B5-8137-9DF3F51BA10A}">
-      <p15:sldGuideLst xmlns="" xmlns:p15="http://schemas.microsoft.com/office/powerpoint/2012/main">
+      <p15:sldGuideLst xmlns:p15="http://schemas.microsoft.com/office/powerpoint/2012/main" xmlns="">
         <p15:guide id="1" orient="horz" pos="2160">
           <p15:clr>
             <a:srgbClr val="A4A3A4"/>
@@ -209,7 +209,7 @@
             <a:fld id="{7D53F579-93E2-4493-8F89-9F84C4147133}" type="datetimeFigureOut">
               <a:rPr lang="en-US" smtClean="0"/>
               <a:pPr/>
-              <a:t>2/17/2020</a:t>
+              <a:t>2/18/2020</a:t>
             </a:fld>
             <a:endParaRPr lang="en-US"/>
           </a:p>
@@ -689,7 +689,7 @@
             <a:fld id="{4E660BD3-8963-4C33-8393-80574CA9A839}" type="datetimeFigureOut">
               <a:rPr lang="en-US" smtClean="0"/>
               <a:pPr/>
-              <a:t>2/17/2020</a:t>
+              <a:t>2/18/2020</a:t>
             </a:fld>
             <a:endParaRPr lang="en-US"/>
           </a:p>
@@ -741,7 +741,7 @@
     </p:spTree>
     <p:extLst>
       <p:ext uri="{BB962C8B-B14F-4D97-AF65-F5344CB8AC3E}">
-        <p14:creationId xmlns="" xmlns:p14="http://schemas.microsoft.com/office/powerpoint/2010/main" val="4117866318"/>
+        <p14:creationId xmlns:p14="http://schemas.microsoft.com/office/powerpoint/2010/main" xmlns="" val="4117866318"/>
       </p:ext>
     </p:extLst>
   </p:cSld>
@@ -861,7 +861,7 @@
             <a:fld id="{4E660BD3-8963-4C33-8393-80574CA9A839}" type="datetimeFigureOut">
               <a:rPr lang="en-US" smtClean="0"/>
               <a:pPr/>
-              <a:t>2/17/2020</a:t>
+              <a:t>2/18/2020</a:t>
             </a:fld>
             <a:endParaRPr lang="en-US"/>
           </a:p>
@@ -913,7 +913,7 @@
     </p:spTree>
     <p:extLst>
       <p:ext uri="{BB962C8B-B14F-4D97-AF65-F5344CB8AC3E}">
-        <p14:creationId xmlns="" xmlns:p14="http://schemas.microsoft.com/office/powerpoint/2010/main" val="1321070492"/>
+        <p14:creationId xmlns:p14="http://schemas.microsoft.com/office/powerpoint/2010/main" xmlns="" val="1321070492"/>
       </p:ext>
     </p:extLst>
   </p:cSld>
@@ -1043,7 +1043,7 @@
             <a:fld id="{4E660BD3-8963-4C33-8393-80574CA9A839}" type="datetimeFigureOut">
               <a:rPr lang="en-US" smtClean="0"/>
               <a:pPr/>
-              <a:t>2/17/2020</a:t>
+              <a:t>2/18/2020</a:t>
             </a:fld>
             <a:endParaRPr lang="en-US"/>
           </a:p>
@@ -1095,7 +1095,7 @@
     </p:spTree>
     <p:extLst>
       <p:ext uri="{BB962C8B-B14F-4D97-AF65-F5344CB8AC3E}">
-        <p14:creationId xmlns="" xmlns:p14="http://schemas.microsoft.com/office/powerpoint/2010/main" val="2861801522"/>
+        <p14:creationId xmlns:p14="http://schemas.microsoft.com/office/powerpoint/2010/main" xmlns="" val="2861801522"/>
       </p:ext>
     </p:extLst>
   </p:cSld>
@@ -1215,7 +1215,7 @@
             <a:fld id="{4E660BD3-8963-4C33-8393-80574CA9A839}" type="datetimeFigureOut">
               <a:rPr lang="en-US" smtClean="0"/>
               <a:pPr/>
-              <a:t>2/17/2020</a:t>
+              <a:t>2/18/2020</a:t>
             </a:fld>
             <a:endParaRPr lang="en-US"/>
           </a:p>
@@ -1267,7 +1267,7 @@
     </p:spTree>
     <p:extLst>
       <p:ext uri="{BB962C8B-B14F-4D97-AF65-F5344CB8AC3E}">
-        <p14:creationId xmlns="" xmlns:p14="http://schemas.microsoft.com/office/powerpoint/2010/main" val="2095606258"/>
+        <p14:creationId xmlns:p14="http://schemas.microsoft.com/office/powerpoint/2010/main" xmlns="" val="2095606258"/>
       </p:ext>
     </p:extLst>
   </p:cSld>
@@ -1463,7 +1463,7 @@
             <a:fld id="{4E660BD3-8963-4C33-8393-80574CA9A839}" type="datetimeFigureOut">
               <a:rPr lang="en-US" smtClean="0"/>
               <a:pPr/>
-              <a:t>2/17/2020</a:t>
+              <a:t>2/18/2020</a:t>
             </a:fld>
             <a:endParaRPr lang="en-US"/>
           </a:p>
@@ -1515,7 +1515,7 @@
     </p:spTree>
     <p:extLst>
       <p:ext uri="{BB962C8B-B14F-4D97-AF65-F5344CB8AC3E}">
-        <p14:creationId xmlns="" xmlns:p14="http://schemas.microsoft.com/office/powerpoint/2010/main" val="1090210665"/>
+        <p14:creationId xmlns:p14="http://schemas.microsoft.com/office/powerpoint/2010/main" xmlns="" val="1090210665"/>
       </p:ext>
     </p:extLst>
   </p:cSld>
@@ -1697,7 +1697,7 @@
             <a:fld id="{4E660BD3-8963-4C33-8393-80574CA9A839}" type="datetimeFigureOut">
               <a:rPr lang="en-US" smtClean="0"/>
               <a:pPr/>
-              <a:t>2/17/2020</a:t>
+              <a:t>2/18/2020</a:t>
             </a:fld>
             <a:endParaRPr lang="en-US"/>
           </a:p>
@@ -1749,7 +1749,7 @@
     </p:spTree>
     <p:extLst>
       <p:ext uri="{BB962C8B-B14F-4D97-AF65-F5344CB8AC3E}">
-        <p14:creationId xmlns="" xmlns:p14="http://schemas.microsoft.com/office/powerpoint/2010/main" val="3393881859"/>
+        <p14:creationId xmlns:p14="http://schemas.microsoft.com/office/powerpoint/2010/main" xmlns="" val="3393881859"/>
       </p:ext>
     </p:extLst>
   </p:cSld>
@@ -2066,7 +2066,7 @@
             <a:fld id="{4E660BD3-8963-4C33-8393-80574CA9A839}" type="datetimeFigureOut">
               <a:rPr lang="en-US" smtClean="0"/>
               <a:pPr/>
-              <a:t>2/17/2020</a:t>
+              <a:t>2/18/2020</a:t>
             </a:fld>
             <a:endParaRPr lang="en-US"/>
           </a:p>
@@ -2118,7 +2118,7 @@
     </p:spTree>
     <p:extLst>
       <p:ext uri="{BB962C8B-B14F-4D97-AF65-F5344CB8AC3E}">
-        <p14:creationId xmlns="" xmlns:p14="http://schemas.microsoft.com/office/powerpoint/2010/main" val="1575907112"/>
+        <p14:creationId xmlns:p14="http://schemas.microsoft.com/office/powerpoint/2010/main" xmlns="" val="1575907112"/>
       </p:ext>
     </p:extLst>
   </p:cSld>
@@ -2186,7 +2186,7 @@
             <a:fld id="{4E660BD3-8963-4C33-8393-80574CA9A839}" type="datetimeFigureOut">
               <a:rPr lang="en-US" smtClean="0"/>
               <a:pPr/>
-              <a:t>2/17/2020</a:t>
+              <a:t>2/18/2020</a:t>
             </a:fld>
             <a:endParaRPr lang="en-US"/>
           </a:p>
@@ -2238,7 +2238,7 @@
     </p:spTree>
     <p:extLst>
       <p:ext uri="{BB962C8B-B14F-4D97-AF65-F5344CB8AC3E}">
-        <p14:creationId xmlns="" xmlns:p14="http://schemas.microsoft.com/office/powerpoint/2010/main" val="3673902886"/>
+        <p14:creationId xmlns:p14="http://schemas.microsoft.com/office/powerpoint/2010/main" xmlns="" val="3673902886"/>
       </p:ext>
     </p:extLst>
   </p:cSld>
@@ -2283,7 +2283,7 @@
             <a:fld id="{4E660BD3-8963-4C33-8393-80574CA9A839}" type="datetimeFigureOut">
               <a:rPr lang="en-US" smtClean="0"/>
               <a:pPr/>
-              <a:t>2/17/2020</a:t>
+              <a:t>2/18/2020</a:t>
             </a:fld>
             <a:endParaRPr lang="en-US"/>
           </a:p>
@@ -2335,7 +2335,7 @@
     </p:spTree>
     <p:extLst>
       <p:ext uri="{BB962C8B-B14F-4D97-AF65-F5344CB8AC3E}">
-        <p14:creationId xmlns="" xmlns:p14="http://schemas.microsoft.com/office/powerpoint/2010/main" val="2564443960"/>
+        <p14:creationId xmlns:p14="http://schemas.microsoft.com/office/powerpoint/2010/main" xmlns="" val="2564443960"/>
       </p:ext>
     </p:extLst>
   </p:cSld>
@@ -2562,7 +2562,7 @@
             <a:fld id="{4E660BD3-8963-4C33-8393-80574CA9A839}" type="datetimeFigureOut">
               <a:rPr lang="en-US" smtClean="0"/>
               <a:pPr/>
-              <a:t>2/17/2020</a:t>
+              <a:t>2/18/2020</a:t>
             </a:fld>
             <a:endParaRPr lang="en-US"/>
           </a:p>
@@ -2614,7 +2614,7 @@
     </p:spTree>
     <p:extLst>
       <p:ext uri="{BB962C8B-B14F-4D97-AF65-F5344CB8AC3E}">
-        <p14:creationId xmlns="" xmlns:p14="http://schemas.microsoft.com/office/powerpoint/2010/main" val="720308840"/>
+        <p14:creationId xmlns:p14="http://schemas.microsoft.com/office/powerpoint/2010/main" xmlns="" val="720308840"/>
       </p:ext>
     </p:extLst>
   </p:cSld>
@@ -2817,7 +2817,7 @@
             <a:fld id="{4E660BD3-8963-4C33-8393-80574CA9A839}" type="datetimeFigureOut">
               <a:rPr lang="en-US" smtClean="0"/>
               <a:pPr/>
-              <a:t>2/17/2020</a:t>
+              <a:t>2/18/2020</a:t>
             </a:fld>
             <a:endParaRPr lang="en-US"/>
           </a:p>
@@ -2869,7 +2869,7 @@
     </p:spTree>
     <p:extLst>
       <p:ext uri="{BB962C8B-B14F-4D97-AF65-F5344CB8AC3E}">
-        <p14:creationId xmlns="" xmlns:p14="http://schemas.microsoft.com/office/powerpoint/2010/main" val="2991676627"/>
+        <p14:creationId xmlns:p14="http://schemas.microsoft.com/office/powerpoint/2010/main" xmlns="" val="2991676627"/>
       </p:ext>
     </p:extLst>
   </p:cSld>
@@ -3032,7 +3032,7 @@
             <a:fld id="{4E660BD3-8963-4C33-8393-80574CA9A839}" type="datetimeFigureOut">
               <a:rPr lang="en-US" smtClean="0"/>
               <a:pPr/>
-              <a:t>2/17/2020</a:t>
+              <a:t>2/18/2020</a:t>
             </a:fld>
             <a:endParaRPr lang="en-US"/>
           </a:p>
@@ -3120,7 +3120,7 @@
     </p:spTree>
     <p:extLst>
       <p:ext uri="{BB962C8B-B14F-4D97-AF65-F5344CB8AC3E}">
-        <p14:creationId xmlns="" xmlns:p14="http://schemas.microsoft.com/office/powerpoint/2010/main" val="1170617722"/>
+        <p14:creationId xmlns:p14="http://schemas.microsoft.com/office/powerpoint/2010/main" xmlns="" val="1170617722"/>
       </p:ext>
     </p:extLst>
   </p:cSld>
@@ -3450,7 +3450,7 @@
           <a:blip r:embed="rId3" cstate="print">
             <a:extLst>
               <a:ext uri="{28A0092B-C50C-407E-A947-70E740481C1C}">
-                <a14:useLocalDpi xmlns="" xmlns:a14="http://schemas.microsoft.com/office/drawing/2010/main" val="0"/>
+                <a14:useLocalDpi xmlns:a14="http://schemas.microsoft.com/office/drawing/2010/main" xmlns="" val="0"/>
               </a:ext>
             </a:extLst>
           </a:blip>
@@ -3968,7 +3968,7 @@
           <a:blip r:embed="rId3" cstate="print">
             <a:extLst>
               <a:ext uri="{28A0092B-C50C-407E-A947-70E740481C1C}">
-                <a14:useLocalDpi xmlns="" xmlns:a14="http://schemas.microsoft.com/office/drawing/2010/main" val="0"/>
+                <a14:useLocalDpi xmlns:a14="http://schemas.microsoft.com/office/drawing/2010/main" xmlns="" val="0"/>
               </a:ext>
             </a:extLst>
           </a:blip>
@@ -3995,7 +3995,7 @@
           <p:nvPr>
             <p:extLst>
               <p:ext uri="{D42A27DB-BD31-4B8C-83A1-F6EECF244321}">
-                <p14:modId xmlns="" xmlns:p14="http://schemas.microsoft.com/office/powerpoint/2010/main" val="2179892277"/>
+                <p14:modId xmlns:p14="http://schemas.microsoft.com/office/powerpoint/2010/main" xmlns="" val="2179892277"/>
               </p:ext>
             </p:extLst>
           </p:nvPr>
@@ -4014,7 +4014,7 @@
                 <a:gridCol w="1868367">
                   <a:extLst>
                     <a:ext uri="{9D8B030D-6E8A-4147-A177-3AD203B41FA5}">
-                      <a16:colId xmlns="" xmlns:a16="http://schemas.microsoft.com/office/drawing/2014/main" val="2749648825"/>
+                      <a16:colId xmlns:a16="http://schemas.microsoft.com/office/drawing/2014/main" xmlns="" val="2749648825"/>
                     </a:ext>
                   </a:extLst>
                 </a:gridCol>
@@ -4036,7 +4036,7 @@
                 </a:tc>
                 <a:extLst>
                   <a:ext uri="{0D108BD9-81ED-4DB2-BD59-A6C34878D82A}">
-                    <a16:rowId xmlns="" xmlns:a16="http://schemas.microsoft.com/office/drawing/2014/main" val="1186927303"/>
+                    <a16:rowId xmlns:a16="http://schemas.microsoft.com/office/drawing/2014/main" xmlns="" val="1186927303"/>
                   </a:ext>
                 </a:extLst>
               </a:tr>
@@ -4057,7 +4057,7 @@
                 </a:tc>
                 <a:extLst>
                   <a:ext uri="{0D108BD9-81ED-4DB2-BD59-A6C34878D82A}">
-                    <a16:rowId xmlns="" xmlns:a16="http://schemas.microsoft.com/office/drawing/2014/main" val="3358398687"/>
+                    <a16:rowId xmlns:a16="http://schemas.microsoft.com/office/drawing/2014/main" xmlns="" val="3358398687"/>
                   </a:ext>
                 </a:extLst>
               </a:tr>
@@ -4078,7 +4078,7 @@
                 </a:tc>
                 <a:extLst>
                   <a:ext uri="{0D108BD9-81ED-4DB2-BD59-A6C34878D82A}">
-                    <a16:rowId xmlns="" xmlns:a16="http://schemas.microsoft.com/office/drawing/2014/main" val="1761697750"/>
+                    <a16:rowId xmlns:a16="http://schemas.microsoft.com/office/drawing/2014/main" xmlns="" val="1761697750"/>
                   </a:ext>
                 </a:extLst>
               </a:tr>
@@ -4103,7 +4103,7 @@
                 </a:tc>
                 <a:extLst>
                   <a:ext uri="{0D108BD9-81ED-4DB2-BD59-A6C34878D82A}">
-                    <a16:rowId xmlns="" xmlns:a16="http://schemas.microsoft.com/office/drawing/2014/main" val="3383609573"/>
+                    <a16:rowId xmlns:a16="http://schemas.microsoft.com/office/drawing/2014/main" xmlns="" val="3383609573"/>
                   </a:ext>
                 </a:extLst>
               </a:tr>
@@ -4124,7 +4124,7 @@
                 </a:tc>
                 <a:extLst>
                   <a:ext uri="{0D108BD9-81ED-4DB2-BD59-A6C34878D82A}">
-                    <a16:rowId xmlns="" xmlns:a16="http://schemas.microsoft.com/office/drawing/2014/main" val="3966298824"/>
+                    <a16:rowId xmlns:a16="http://schemas.microsoft.com/office/drawing/2014/main" xmlns="" val="3966298824"/>
                   </a:ext>
                 </a:extLst>
               </a:tr>
@@ -4149,7 +4149,7 @@
                 </a:tc>
                 <a:extLst>
                   <a:ext uri="{0D108BD9-81ED-4DB2-BD59-A6C34878D82A}">
-                    <a16:rowId xmlns="" xmlns:a16="http://schemas.microsoft.com/office/drawing/2014/main" val="1041985094"/>
+                    <a16:rowId xmlns:a16="http://schemas.microsoft.com/office/drawing/2014/main" xmlns="" val="1041985094"/>
                   </a:ext>
                 </a:extLst>
               </a:tr>
@@ -4170,7 +4170,7 @@
                 </a:tc>
                 <a:extLst>
                   <a:ext uri="{0D108BD9-81ED-4DB2-BD59-A6C34878D82A}">
-                    <a16:rowId xmlns="" xmlns:a16="http://schemas.microsoft.com/office/drawing/2014/main" val="392577592"/>
+                    <a16:rowId xmlns:a16="http://schemas.microsoft.com/office/drawing/2014/main" xmlns="" val="392577592"/>
                   </a:ext>
                 </a:extLst>
               </a:tr>
@@ -4191,7 +4191,7 @@
                 </a:tc>
                 <a:extLst>
                   <a:ext uri="{0D108BD9-81ED-4DB2-BD59-A6C34878D82A}">
-                    <a16:rowId xmlns="" xmlns:a16="http://schemas.microsoft.com/office/drawing/2014/main" val="3196274515"/>
+                    <a16:rowId xmlns:a16="http://schemas.microsoft.com/office/drawing/2014/main" xmlns="" val="3196274515"/>
                   </a:ext>
                 </a:extLst>
               </a:tr>
@@ -4208,7 +4208,7 @@
           <p:nvPr>
             <p:extLst>
               <p:ext uri="{D42A27DB-BD31-4B8C-83A1-F6EECF244321}">
-                <p14:modId xmlns="" xmlns:p14="http://schemas.microsoft.com/office/powerpoint/2010/main" val="3376360791"/>
+                <p14:modId xmlns:p14="http://schemas.microsoft.com/office/powerpoint/2010/main" xmlns="" val="3376360791"/>
               </p:ext>
             </p:extLst>
           </p:nvPr>
@@ -4227,7 +4227,7 @@
                 <a:gridCol w="1813625">
                   <a:extLst>
                     <a:ext uri="{9D8B030D-6E8A-4147-A177-3AD203B41FA5}">
-                      <a16:colId xmlns="" xmlns:a16="http://schemas.microsoft.com/office/drawing/2014/main" val="2749648825"/>
+                      <a16:colId xmlns:a16="http://schemas.microsoft.com/office/drawing/2014/main" xmlns="" val="2749648825"/>
                     </a:ext>
                   </a:extLst>
                 </a:gridCol>
@@ -4249,7 +4249,7 @@
                 </a:tc>
                 <a:extLst>
                   <a:ext uri="{0D108BD9-81ED-4DB2-BD59-A6C34878D82A}">
-                    <a16:rowId xmlns="" xmlns:a16="http://schemas.microsoft.com/office/drawing/2014/main" val="1186927303"/>
+                    <a16:rowId xmlns:a16="http://schemas.microsoft.com/office/drawing/2014/main" xmlns="" val="1186927303"/>
                   </a:ext>
                 </a:extLst>
               </a:tr>
@@ -4282,7 +4282,7 @@
                 </a:tc>
                 <a:extLst>
                   <a:ext uri="{0D108BD9-81ED-4DB2-BD59-A6C34878D82A}">
-                    <a16:rowId xmlns="" xmlns:a16="http://schemas.microsoft.com/office/drawing/2014/main" val="10002"/>
+                    <a16:rowId xmlns:a16="http://schemas.microsoft.com/office/drawing/2014/main" xmlns="" val="10002"/>
                   </a:ext>
                 </a:extLst>
               </a:tr>
@@ -4327,7 +4327,7 @@
                 </a:tc>
                 <a:extLst>
                   <a:ext uri="{0D108BD9-81ED-4DB2-BD59-A6C34878D82A}">
-                    <a16:rowId xmlns="" xmlns:a16="http://schemas.microsoft.com/office/drawing/2014/main" val="1681777418"/>
+                    <a16:rowId xmlns:a16="http://schemas.microsoft.com/office/drawing/2014/main" xmlns="" val="1681777418"/>
                   </a:ext>
                 </a:extLst>
               </a:tr>
@@ -4356,7 +4356,7 @@
                 </a:tc>
                 <a:extLst>
                   <a:ext uri="{0D108BD9-81ED-4DB2-BD59-A6C34878D82A}">
-                    <a16:rowId xmlns="" xmlns:a16="http://schemas.microsoft.com/office/drawing/2014/main" val="1761697750"/>
+                    <a16:rowId xmlns:a16="http://schemas.microsoft.com/office/drawing/2014/main" xmlns="" val="1761697750"/>
                   </a:ext>
                 </a:extLst>
               </a:tr>
@@ -4381,7 +4381,7 @@
                 </a:tc>
                 <a:extLst>
                   <a:ext uri="{0D108BD9-81ED-4DB2-BD59-A6C34878D82A}">
-                    <a16:rowId xmlns="" xmlns:a16="http://schemas.microsoft.com/office/drawing/2014/main" val="582597117"/>
+                    <a16:rowId xmlns:a16="http://schemas.microsoft.com/office/drawing/2014/main" xmlns="" val="582597117"/>
                   </a:ext>
                 </a:extLst>
               </a:tr>
@@ -4412,7 +4412,7 @@
                 </a:tc>
                 <a:extLst>
                   <a:ext uri="{0D108BD9-81ED-4DB2-BD59-A6C34878D82A}">
-                    <a16:rowId xmlns="" xmlns:a16="http://schemas.microsoft.com/office/drawing/2014/main" val="3448361831"/>
+                    <a16:rowId xmlns:a16="http://schemas.microsoft.com/office/drawing/2014/main" xmlns="" val="3448361831"/>
                   </a:ext>
                 </a:extLst>
               </a:tr>
@@ -4429,7 +4429,7 @@
           <p:nvPr>
             <p:extLst>
               <p:ext uri="{D42A27DB-BD31-4B8C-83A1-F6EECF244321}">
-                <p14:modId xmlns="" xmlns:p14="http://schemas.microsoft.com/office/powerpoint/2010/main" val="3729796579"/>
+                <p14:modId xmlns:p14="http://schemas.microsoft.com/office/powerpoint/2010/main" xmlns="" val="3729796579"/>
               </p:ext>
             </p:extLst>
           </p:nvPr>
@@ -4448,7 +4448,7 @@
                 <a:gridCol w="2667309">
                   <a:extLst>
                     <a:ext uri="{9D8B030D-6E8A-4147-A177-3AD203B41FA5}">
-                      <a16:colId xmlns="" xmlns:a16="http://schemas.microsoft.com/office/drawing/2014/main" val="2749648825"/>
+                      <a16:colId xmlns:a16="http://schemas.microsoft.com/office/drawing/2014/main" xmlns="" val="2749648825"/>
                     </a:ext>
                   </a:extLst>
                 </a:gridCol>
@@ -4470,7 +4470,7 @@
                 </a:tc>
                 <a:extLst>
                   <a:ext uri="{0D108BD9-81ED-4DB2-BD59-A6C34878D82A}">
-                    <a16:rowId xmlns="" xmlns:a16="http://schemas.microsoft.com/office/drawing/2014/main" val="1186927303"/>
+                    <a16:rowId xmlns:a16="http://schemas.microsoft.com/office/drawing/2014/main" xmlns="" val="1186927303"/>
                   </a:ext>
                 </a:extLst>
               </a:tr>
@@ -4512,7 +4512,7 @@
                 </a:tc>
                 <a:extLst>
                   <a:ext uri="{0D108BD9-81ED-4DB2-BD59-A6C34878D82A}">
-                    <a16:rowId xmlns="" xmlns:a16="http://schemas.microsoft.com/office/drawing/2014/main" val="2827937352"/>
+                    <a16:rowId xmlns:a16="http://schemas.microsoft.com/office/drawing/2014/main" xmlns="" val="2827937352"/>
                   </a:ext>
                 </a:extLst>
               </a:tr>
@@ -4533,7 +4533,7 @@
                 </a:tc>
                 <a:extLst>
                   <a:ext uri="{0D108BD9-81ED-4DB2-BD59-A6C34878D82A}">
-                    <a16:rowId xmlns="" xmlns:a16="http://schemas.microsoft.com/office/drawing/2014/main" val="3358398687"/>
+                    <a16:rowId xmlns:a16="http://schemas.microsoft.com/office/drawing/2014/main" xmlns="" val="3358398687"/>
                   </a:ext>
                 </a:extLst>
               </a:tr>
@@ -4570,7 +4570,7 @@
                 </a:tc>
                 <a:extLst>
                   <a:ext uri="{0D108BD9-81ED-4DB2-BD59-A6C34878D82A}">
-                    <a16:rowId xmlns="" xmlns:a16="http://schemas.microsoft.com/office/drawing/2014/main" val="1761697750"/>
+                    <a16:rowId xmlns:a16="http://schemas.microsoft.com/office/drawing/2014/main" xmlns="" val="1761697750"/>
                   </a:ext>
                 </a:extLst>
               </a:tr>
@@ -4595,7 +4595,7 @@
                 </a:tc>
                 <a:extLst>
                   <a:ext uri="{0D108BD9-81ED-4DB2-BD59-A6C34878D82A}">
-                    <a16:rowId xmlns="" xmlns:a16="http://schemas.microsoft.com/office/drawing/2014/main" val="3966298824"/>
+                    <a16:rowId xmlns:a16="http://schemas.microsoft.com/office/drawing/2014/main" xmlns="" val="3966298824"/>
                   </a:ext>
                 </a:extLst>
               </a:tr>
@@ -4624,7 +4624,7 @@
                 </a:tc>
                 <a:extLst>
                   <a:ext uri="{0D108BD9-81ED-4DB2-BD59-A6C34878D82A}">
-                    <a16:rowId xmlns="" xmlns:a16="http://schemas.microsoft.com/office/drawing/2014/main" val="1665772014"/>
+                    <a16:rowId xmlns:a16="http://schemas.microsoft.com/office/drawing/2014/main" xmlns="" val="1665772014"/>
                   </a:ext>
                 </a:extLst>
               </a:tr>
@@ -4645,7 +4645,7 @@
                 </a:tc>
                 <a:extLst>
                   <a:ext uri="{0D108BD9-81ED-4DB2-BD59-A6C34878D82A}">
-                    <a16:rowId xmlns="" xmlns:a16="http://schemas.microsoft.com/office/drawing/2014/main" val="1911882416"/>
+                    <a16:rowId xmlns:a16="http://schemas.microsoft.com/office/drawing/2014/main" xmlns="" val="1911882416"/>
                   </a:ext>
                 </a:extLst>
               </a:tr>
@@ -4662,7 +4662,7 @@
           <p:nvPr>
             <p:extLst>
               <p:ext uri="{D42A27DB-BD31-4B8C-83A1-F6EECF244321}">
-                <p14:modId xmlns="" xmlns:p14="http://schemas.microsoft.com/office/powerpoint/2010/main" val="2848375722"/>
+                <p14:modId xmlns:p14="http://schemas.microsoft.com/office/powerpoint/2010/main" xmlns="" val="2848375722"/>
               </p:ext>
             </p:extLst>
           </p:nvPr>
@@ -4681,7 +4681,7 @@
                 <a:gridCol w="1687021">
                   <a:extLst>
                     <a:ext uri="{9D8B030D-6E8A-4147-A177-3AD203B41FA5}">
-                      <a16:colId xmlns="" xmlns:a16="http://schemas.microsoft.com/office/drawing/2014/main" val="2749648825"/>
+                      <a16:colId xmlns:a16="http://schemas.microsoft.com/office/drawing/2014/main" xmlns="" val="2749648825"/>
                     </a:ext>
                   </a:extLst>
                 </a:gridCol>
@@ -4703,7 +4703,7 @@
                 </a:tc>
                 <a:extLst>
                   <a:ext uri="{0D108BD9-81ED-4DB2-BD59-A6C34878D82A}">
-                    <a16:rowId xmlns="" xmlns:a16="http://schemas.microsoft.com/office/drawing/2014/main" val="1186927303"/>
+                    <a16:rowId xmlns:a16="http://schemas.microsoft.com/office/drawing/2014/main" xmlns="" val="1186927303"/>
                   </a:ext>
                 </a:extLst>
               </a:tr>
@@ -4732,7 +4732,7 @@
                 </a:tc>
                 <a:extLst>
                   <a:ext uri="{0D108BD9-81ED-4DB2-BD59-A6C34878D82A}">
-                    <a16:rowId xmlns="" xmlns:a16="http://schemas.microsoft.com/office/drawing/2014/main" val="3358398687"/>
+                    <a16:rowId xmlns:a16="http://schemas.microsoft.com/office/drawing/2014/main" xmlns="" val="3358398687"/>
                   </a:ext>
                 </a:extLst>
               </a:tr>
@@ -4769,7 +4769,7 @@
                 </a:tc>
                 <a:extLst>
                   <a:ext uri="{0D108BD9-81ED-4DB2-BD59-A6C34878D82A}">
-                    <a16:rowId xmlns="" xmlns:a16="http://schemas.microsoft.com/office/drawing/2014/main" val="1761697750"/>
+                    <a16:rowId xmlns:a16="http://schemas.microsoft.com/office/drawing/2014/main" xmlns="" val="1761697750"/>
                   </a:ext>
                 </a:extLst>
               </a:tr>
@@ -4794,7 +4794,7 @@
                 </a:tc>
                 <a:extLst>
                   <a:ext uri="{0D108BD9-81ED-4DB2-BD59-A6C34878D82A}">
-                    <a16:rowId xmlns="" xmlns:a16="http://schemas.microsoft.com/office/drawing/2014/main" val="3383609573"/>
+                    <a16:rowId xmlns:a16="http://schemas.microsoft.com/office/drawing/2014/main" xmlns="" val="3383609573"/>
                   </a:ext>
                 </a:extLst>
               </a:tr>
@@ -4815,7 +4815,7 @@
                 </a:tc>
                 <a:extLst>
                   <a:ext uri="{0D108BD9-81ED-4DB2-BD59-A6C34878D82A}">
-                    <a16:rowId xmlns="" xmlns:a16="http://schemas.microsoft.com/office/drawing/2014/main" val="3966298824"/>
+                    <a16:rowId xmlns:a16="http://schemas.microsoft.com/office/drawing/2014/main" xmlns="" val="3966298824"/>
                   </a:ext>
                 </a:extLst>
               </a:tr>
@@ -4860,7 +4860,7 @@
                 </a:tc>
                 <a:extLst>
                   <a:ext uri="{0D108BD9-81ED-4DB2-BD59-A6C34878D82A}">
-                    <a16:rowId xmlns="" xmlns:a16="http://schemas.microsoft.com/office/drawing/2014/main" val="2497034091"/>
+                    <a16:rowId xmlns:a16="http://schemas.microsoft.com/office/drawing/2014/main" xmlns="" val="2497034091"/>
                   </a:ext>
                 </a:extLst>
               </a:tr>
@@ -4877,7 +4877,7 @@
           <p:nvPr>
             <p:extLst>
               <p:ext uri="{D42A27DB-BD31-4B8C-83A1-F6EECF244321}">
-                <p14:modId xmlns="" xmlns:p14="http://schemas.microsoft.com/office/powerpoint/2010/main" val="2363931275"/>
+                <p14:modId xmlns:p14="http://schemas.microsoft.com/office/powerpoint/2010/main" xmlns="" val="2363931275"/>
               </p:ext>
             </p:extLst>
           </p:nvPr>
@@ -4896,7 +4896,7 @@
                 <a:gridCol w="1945717">
                   <a:extLst>
                     <a:ext uri="{9D8B030D-6E8A-4147-A177-3AD203B41FA5}">
-                      <a16:colId xmlns="" xmlns:a16="http://schemas.microsoft.com/office/drawing/2014/main" val="2749648825"/>
+                      <a16:colId xmlns:a16="http://schemas.microsoft.com/office/drawing/2014/main" xmlns="" val="2749648825"/>
                     </a:ext>
                   </a:extLst>
                 </a:gridCol>
@@ -4918,7 +4918,7 @@
                 </a:tc>
                 <a:extLst>
                   <a:ext uri="{0D108BD9-81ED-4DB2-BD59-A6C34878D82A}">
-                    <a16:rowId xmlns="" xmlns:a16="http://schemas.microsoft.com/office/drawing/2014/main" val="1186927303"/>
+                    <a16:rowId xmlns:a16="http://schemas.microsoft.com/office/drawing/2014/main" xmlns="" val="1186927303"/>
                   </a:ext>
                 </a:extLst>
               </a:tr>
@@ -4939,7 +4939,7 @@
                 </a:tc>
                 <a:extLst>
                   <a:ext uri="{0D108BD9-81ED-4DB2-BD59-A6C34878D82A}">
-                    <a16:rowId xmlns="" xmlns:a16="http://schemas.microsoft.com/office/drawing/2014/main" val="3358398687"/>
+                    <a16:rowId xmlns:a16="http://schemas.microsoft.com/office/drawing/2014/main" xmlns="" val="3358398687"/>
                   </a:ext>
                 </a:extLst>
               </a:tr>
@@ -4960,7 +4960,7 @@
                 </a:tc>
                 <a:extLst>
                   <a:ext uri="{0D108BD9-81ED-4DB2-BD59-A6C34878D82A}">
-                    <a16:rowId xmlns="" xmlns:a16="http://schemas.microsoft.com/office/drawing/2014/main" val="10002"/>
+                    <a16:rowId xmlns:a16="http://schemas.microsoft.com/office/drawing/2014/main" xmlns="" val="10002"/>
                   </a:ext>
                 </a:extLst>
               </a:tr>
@@ -4981,7 +4981,7 @@
                 </a:tc>
                 <a:extLst>
                   <a:ext uri="{0D108BD9-81ED-4DB2-BD59-A6C34878D82A}">
-                    <a16:rowId xmlns="" xmlns:a16="http://schemas.microsoft.com/office/drawing/2014/main" val="10003"/>
+                    <a16:rowId xmlns:a16="http://schemas.microsoft.com/office/drawing/2014/main" xmlns="" val="10003"/>
                   </a:ext>
                 </a:extLst>
               </a:tr>
@@ -5000,6 +5000,11 @@
                   </a:txBody>
                   <a:tcPr/>
                 </a:tc>
+                <a:extLst>
+                  <a:ext uri="{0D108BD9-81ED-4DB2-BD59-A6C34878D82A}">
+                    <a16:rowId xmlns:a16="http://schemas.microsoft.com/office/drawing/2014/main" xmlns="" val="10004"/>
+                  </a:ext>
+                </a:extLst>
               </a:tr>
             </a:tbl>
           </a:graphicData>
@@ -5014,7 +5019,7 @@
           <p:nvPr>
             <p:extLst>
               <p:ext uri="{D42A27DB-BD31-4B8C-83A1-F6EECF244321}">
-                <p14:modId xmlns="" xmlns:p14="http://schemas.microsoft.com/office/powerpoint/2010/main" val="1487404572"/>
+                <p14:modId xmlns:p14="http://schemas.microsoft.com/office/powerpoint/2010/main" xmlns="" val="1487404572"/>
               </p:ext>
             </p:extLst>
           </p:nvPr>
@@ -5033,7 +5038,7 @@
                 <a:gridCol w="1994536">
                   <a:extLst>
                     <a:ext uri="{9D8B030D-6E8A-4147-A177-3AD203B41FA5}">
-                      <a16:colId xmlns="" xmlns:a16="http://schemas.microsoft.com/office/drawing/2014/main" val="2749648825"/>
+                      <a16:colId xmlns:a16="http://schemas.microsoft.com/office/drawing/2014/main" xmlns="" val="2749648825"/>
                     </a:ext>
                   </a:extLst>
                 </a:gridCol>
@@ -5059,7 +5064,7 @@
                 </a:tc>
                 <a:extLst>
                   <a:ext uri="{0D108BD9-81ED-4DB2-BD59-A6C34878D82A}">
-                    <a16:rowId xmlns="" xmlns:a16="http://schemas.microsoft.com/office/drawing/2014/main" val="1186927303"/>
+                    <a16:rowId xmlns:a16="http://schemas.microsoft.com/office/drawing/2014/main" xmlns="" val="1186927303"/>
                   </a:ext>
                 </a:extLst>
               </a:tr>
@@ -5080,7 +5085,7 @@
                 </a:tc>
                 <a:extLst>
                   <a:ext uri="{0D108BD9-81ED-4DB2-BD59-A6C34878D82A}">
-                    <a16:rowId xmlns="" xmlns:a16="http://schemas.microsoft.com/office/drawing/2014/main" val="3358398687"/>
+                    <a16:rowId xmlns:a16="http://schemas.microsoft.com/office/drawing/2014/main" xmlns="" val="3358398687"/>
                   </a:ext>
                 </a:extLst>
               </a:tr>
@@ -5117,7 +5122,7 @@
                 </a:tc>
                 <a:extLst>
                   <a:ext uri="{0D108BD9-81ED-4DB2-BD59-A6C34878D82A}">
-                    <a16:rowId xmlns="" xmlns:a16="http://schemas.microsoft.com/office/drawing/2014/main" val="1761697750"/>
+                    <a16:rowId xmlns:a16="http://schemas.microsoft.com/office/drawing/2014/main" xmlns="" val="1761697750"/>
                   </a:ext>
                 </a:extLst>
               </a:tr>
@@ -5232,8 +5237,8 @@
         </p:nvSpPr>
         <p:spPr>
           <a:xfrm>
-            <a:off x="10334445" y="6142008"/>
-            <a:ext cx="1200393" cy="369332"/>
+            <a:off x="9672046" y="6066899"/>
+            <a:ext cx="2081595" cy="369332"/>
           </a:xfrm>
           <a:prstGeom prst="rect">
             <a:avLst/>
@@ -5248,7 +5253,7 @@
           <a:p>
             <a:r>
               <a:rPr lang="en-US" dirty="0" smtClean="0"/>
-              <a:t>4 in Av bay</a:t>
+              <a:t>L3, 4 in Av bay, 11 in</a:t>
             </a:r>
             <a:endParaRPr lang="en-US" dirty="0"/>
           </a:p>
@@ -5371,7 +5376,7 @@
           <p:nvPr>
             <p:extLst>
               <p:ext uri="{D42A27DB-BD31-4B8C-83A1-F6EECF244321}">
-                <p14:modId xmlns="" xmlns:p14="http://schemas.microsoft.com/office/powerpoint/2010/main" val="1225392099"/>
+                <p14:modId xmlns:p14="http://schemas.microsoft.com/office/powerpoint/2010/main" xmlns="" val="1225392099"/>
               </p:ext>
             </p:extLst>
           </p:nvPr>
@@ -5390,7 +5395,7 @@
                 <a:gridCol w="1687021">
                   <a:extLst>
                     <a:ext uri="{9D8B030D-6E8A-4147-A177-3AD203B41FA5}">
-                      <a16:colId xmlns="" xmlns:a16="http://schemas.microsoft.com/office/drawing/2014/main" val="2749648825"/>
+                      <a16:colId xmlns:a16="http://schemas.microsoft.com/office/drawing/2014/main" xmlns="" val="2749648825"/>
                     </a:ext>
                   </a:extLst>
                 </a:gridCol>
@@ -5412,7 +5417,7 @@
                 </a:tc>
                 <a:extLst>
                   <a:ext uri="{0D108BD9-81ED-4DB2-BD59-A6C34878D82A}">
-                    <a16:rowId xmlns="" xmlns:a16="http://schemas.microsoft.com/office/drawing/2014/main" val="1186927303"/>
+                    <a16:rowId xmlns:a16="http://schemas.microsoft.com/office/drawing/2014/main" xmlns="" val="1186927303"/>
                   </a:ext>
                 </a:extLst>
               </a:tr>
@@ -5433,7 +5438,7 @@
                 </a:tc>
                 <a:extLst>
                   <a:ext uri="{0D108BD9-81ED-4DB2-BD59-A6C34878D82A}">
-                    <a16:rowId xmlns="" xmlns:a16="http://schemas.microsoft.com/office/drawing/2014/main" val="3966298824"/>
+                    <a16:rowId xmlns:a16="http://schemas.microsoft.com/office/drawing/2014/main" xmlns="" val="3966298824"/>
                   </a:ext>
                 </a:extLst>
               </a:tr>
@@ -5470,7 +5475,7 @@
                 </a:tc>
                 <a:extLst>
                   <a:ext uri="{0D108BD9-81ED-4DB2-BD59-A6C34878D82A}">
-                    <a16:rowId xmlns="" xmlns:a16="http://schemas.microsoft.com/office/drawing/2014/main" val="2201266787"/>
+                    <a16:rowId xmlns:a16="http://schemas.microsoft.com/office/drawing/2014/main" xmlns="" val="2201266787"/>
                   </a:ext>
                 </a:extLst>
               </a:tr>
@@ -5487,14 +5492,14 @@
           <p:nvPr>
             <p:extLst>
               <p:ext uri="{D42A27DB-BD31-4B8C-83A1-F6EECF244321}">
-                <p14:modId xmlns="" xmlns:p14="http://schemas.microsoft.com/office/powerpoint/2010/main" val="1238150250"/>
+                <p14:modId xmlns:p14="http://schemas.microsoft.com/office/powerpoint/2010/main" xmlns="" val="1238150250"/>
               </p:ext>
             </p:extLst>
           </p:nvPr>
         </p:nvGraphicFramePr>
         <p:xfrm>
           <a:off x="4006298" y="5918518"/>
-          <a:ext cx="1964866" cy="822960"/>
+          <a:ext cx="1964866" cy="1005840"/>
         </p:xfrm>
         <a:graphic>
           <a:graphicData uri="http://schemas.openxmlformats.org/drawingml/2006/table">
@@ -5506,7 +5511,7 @@
                 <a:gridCol w="1964866">
                   <a:extLst>
                     <a:ext uri="{9D8B030D-6E8A-4147-A177-3AD203B41FA5}">
-                      <a16:colId xmlns="" xmlns:a16="http://schemas.microsoft.com/office/drawing/2014/main" val="2749648825"/>
+                      <a16:colId xmlns:a16="http://schemas.microsoft.com/office/drawing/2014/main" xmlns="" val="2749648825"/>
                     </a:ext>
                   </a:extLst>
                 </a:gridCol>
@@ -5523,15 +5528,17 @@
                       </a:r>
                       <a:r>
                         <a:rPr lang="en-US" sz="1200" b="1" baseline="0" dirty="0" smtClean="0"/>
-                        <a:t>, </a:t>
-                      </a:r>
-                      <a:r>
-                        <a:rPr lang="en-US" sz="1200" b="1" baseline="0" dirty="0" err="1" smtClean="0"/>
-                        <a:t>Ch</a:t>
+                        <a:t>, Ch 8 </a:t>
                       </a:r>
                       <a:r>
                         <a:rPr lang="en-US" sz="1200" b="1" baseline="0" dirty="0" smtClean="0"/>
-                        <a:t> 8 435.35</a:t>
+                        <a:t>435.35</a:t>
+                      </a:r>
+                    </a:p>
+                    <a:p>
+                      <a:r>
+                        <a:rPr lang="en-US" sz="1200" b="1" baseline="0" dirty="0" smtClean="0"/>
+                        <a:t>KC1BKV  S/N 3587</a:t>
                       </a:r>
                       <a:endParaRPr lang="en-US" sz="1200" b="1" dirty="0"/>
                     </a:p>
@@ -5540,7 +5547,7 @@
                 </a:tc>
                 <a:extLst>
                   <a:ext uri="{0D108BD9-81ED-4DB2-BD59-A6C34878D82A}">
-                    <a16:rowId xmlns="" xmlns:a16="http://schemas.microsoft.com/office/drawing/2014/main" val="1186927303"/>
+                    <a16:rowId xmlns:a16="http://schemas.microsoft.com/office/drawing/2014/main" xmlns="" val="1186927303"/>
                   </a:ext>
                 </a:extLst>
               </a:tr>
@@ -5561,7 +5568,7 @@
                 </a:tc>
                 <a:extLst>
                   <a:ext uri="{0D108BD9-81ED-4DB2-BD59-A6C34878D82A}">
-                    <a16:rowId xmlns="" xmlns:a16="http://schemas.microsoft.com/office/drawing/2014/main" val="3358398687"/>
+                    <a16:rowId xmlns:a16="http://schemas.microsoft.com/office/drawing/2014/main" xmlns="" val="3358398687"/>
                   </a:ext>
                 </a:extLst>
               </a:tr>
@@ -5598,7 +5605,7 @@
                 </a:tc>
                 <a:extLst>
                   <a:ext uri="{0D108BD9-81ED-4DB2-BD59-A6C34878D82A}">
-                    <a16:rowId xmlns="" xmlns:a16="http://schemas.microsoft.com/office/drawing/2014/main" val="1761697750"/>
+                    <a16:rowId xmlns:a16="http://schemas.microsoft.com/office/drawing/2014/main" xmlns="" val="1761697750"/>
                   </a:ext>
                 </a:extLst>
               </a:tr>
@@ -5760,13 +5767,13 @@
           <p:nvPr>
             <p:extLst>
               <p:ext uri="{D42A27DB-BD31-4B8C-83A1-F6EECF244321}">
-                <p14:modId xmlns="" xmlns:p14="http://schemas.microsoft.com/office/powerpoint/2010/main" val="1051959780"/>
+                <p14:modId xmlns:p14="http://schemas.microsoft.com/office/powerpoint/2010/main" xmlns="" val="3845298695"/>
               </p:ext>
             </p:extLst>
           </p:nvPr>
         </p:nvGraphicFramePr>
         <p:xfrm>
-          <a:off x="6104728" y="5918518"/>
+          <a:off x="9452514" y="4031689"/>
           <a:ext cx="1964866" cy="274320"/>
         </p:xfrm>
         <a:graphic>
@@ -5779,7 +5786,7 @@
                 <a:gridCol w="1964866">
                   <a:extLst>
                     <a:ext uri="{9D8B030D-6E8A-4147-A177-3AD203B41FA5}">
-                      <a16:colId xmlns="" xmlns:a16="http://schemas.microsoft.com/office/drawing/2014/main" val="2749648825"/>
+                      <a16:colId xmlns:a16="http://schemas.microsoft.com/office/drawing/2014/main" xmlns="" val="2749648825"/>
                     </a:ext>
                   </a:extLst>
                 </a:gridCol>
@@ -5799,7 +5806,7 @@
                         <a:t>Wifi</a:t>
                       </a:r>
                       <a:r>
-                        <a:rPr lang="en-US" sz="1200" b="1" baseline="0" smtClean="0"/>
+                        <a:rPr lang="en-US" sz="1200" b="1" baseline="0" dirty="0" smtClean="0"/>
                         <a:t> 1C7C0  8383 0360</a:t>
                       </a:r>
                       <a:endParaRPr lang="en-US" sz="1200" b="1" dirty="0"/>
@@ -5809,7 +5816,7 @@
                 </a:tc>
                 <a:extLst>
                   <a:ext uri="{0D108BD9-81ED-4DB2-BD59-A6C34878D82A}">
-                    <a16:rowId xmlns="" xmlns:a16="http://schemas.microsoft.com/office/drawing/2014/main" val="1186927303"/>
+                    <a16:rowId xmlns:a16="http://schemas.microsoft.com/office/drawing/2014/main" xmlns="" val="1186927303"/>
                   </a:ext>
                 </a:extLst>
               </a:tr>
@@ -5817,10 +5824,356 @@
           </a:graphicData>
         </a:graphic>
       </p:graphicFrame>
+      <p:sp>
+        <p:nvSpPr>
+          <p:cNvPr id="3" name="Rectangle 2"/>
+          <p:cNvSpPr/>
+          <p:nvPr/>
+        </p:nvSpPr>
+        <p:spPr>
+          <a:xfrm>
+            <a:off x="6057197" y="4256315"/>
+            <a:ext cx="387347" cy="221381"/>
+          </a:xfrm>
+          <a:prstGeom prst="rect">
+            <a:avLst/>
+          </a:prstGeom>
+          <a:solidFill>
+            <a:srgbClr val="FF0000"/>
+          </a:solidFill>
+        </p:spPr>
+        <p:style>
+          <a:lnRef idx="2">
+            <a:schemeClr val="accent1">
+              <a:shade val="50000"/>
+            </a:schemeClr>
+          </a:lnRef>
+          <a:fillRef idx="1">
+            <a:schemeClr val="accent1"/>
+          </a:fillRef>
+          <a:effectRef idx="0">
+            <a:schemeClr val="accent1"/>
+          </a:effectRef>
+          <a:fontRef idx="minor">
+            <a:schemeClr val="lt1"/>
+          </a:fontRef>
+        </p:style>
+        <p:txBody>
+          <a:bodyPr rtlCol="0" anchor="ctr"/>
+          <a:lstStyle/>
+          <a:p>
+            <a:pPr algn="ctr"/>
+            <a:endParaRPr lang="en-US"/>
+          </a:p>
+        </p:txBody>
+      </p:sp>
+      <p:sp>
+        <p:nvSpPr>
+          <p:cNvPr id="37" name="Rectangle 36"/>
+          <p:cNvSpPr/>
+          <p:nvPr/>
+        </p:nvSpPr>
+        <p:spPr>
+          <a:xfrm>
+            <a:off x="6081397" y="5658792"/>
+            <a:ext cx="387347" cy="221381"/>
+          </a:xfrm>
+          <a:prstGeom prst="rect">
+            <a:avLst/>
+          </a:prstGeom>
+          <a:solidFill>
+            <a:srgbClr val="FFFF00"/>
+          </a:solidFill>
+        </p:spPr>
+        <p:style>
+          <a:lnRef idx="2">
+            <a:schemeClr val="accent1">
+              <a:shade val="50000"/>
+            </a:schemeClr>
+          </a:lnRef>
+          <a:fillRef idx="1">
+            <a:schemeClr val="accent1"/>
+          </a:fillRef>
+          <a:effectRef idx="0">
+            <a:schemeClr val="accent1"/>
+          </a:effectRef>
+          <a:fontRef idx="minor">
+            <a:schemeClr val="lt1"/>
+          </a:fontRef>
+        </p:style>
+        <p:txBody>
+          <a:bodyPr rtlCol="0" anchor="ctr"/>
+          <a:lstStyle/>
+          <a:p>
+            <a:pPr algn="ctr"/>
+            <a:endParaRPr lang="en-US"/>
+          </a:p>
+        </p:txBody>
+      </p:sp>
+      <p:sp>
+        <p:nvSpPr>
+          <p:cNvPr id="38" name="Rectangle 37"/>
+          <p:cNvSpPr/>
+          <p:nvPr/>
+        </p:nvSpPr>
+        <p:spPr>
+          <a:xfrm>
+            <a:off x="6042594" y="4770896"/>
+            <a:ext cx="387347" cy="221381"/>
+          </a:xfrm>
+          <a:prstGeom prst="rect">
+            <a:avLst/>
+          </a:prstGeom>
+          <a:solidFill>
+            <a:srgbClr val="7030A0"/>
+          </a:solidFill>
+        </p:spPr>
+        <p:style>
+          <a:lnRef idx="2">
+            <a:schemeClr val="accent1">
+              <a:shade val="50000"/>
+            </a:schemeClr>
+          </a:lnRef>
+          <a:fillRef idx="1">
+            <a:schemeClr val="accent1"/>
+          </a:fillRef>
+          <a:effectRef idx="0">
+            <a:schemeClr val="accent1"/>
+          </a:effectRef>
+          <a:fontRef idx="minor">
+            <a:schemeClr val="lt1"/>
+          </a:fontRef>
+        </p:style>
+        <p:txBody>
+          <a:bodyPr rtlCol="0" anchor="ctr"/>
+          <a:lstStyle/>
+          <a:p>
+            <a:pPr algn="ctr"/>
+            <a:endParaRPr lang="en-US"/>
+          </a:p>
+        </p:txBody>
+      </p:sp>
+      <p:sp>
+        <p:nvSpPr>
+          <p:cNvPr id="44" name="Rectangle 43"/>
+          <p:cNvSpPr/>
+          <p:nvPr/>
+        </p:nvSpPr>
+        <p:spPr>
+          <a:xfrm>
+            <a:off x="6081396" y="6511340"/>
+            <a:ext cx="387347" cy="221381"/>
+          </a:xfrm>
+          <a:prstGeom prst="rect">
+            <a:avLst/>
+          </a:prstGeom>
+          <a:solidFill>
+            <a:schemeClr val="tx1"/>
+          </a:solidFill>
+        </p:spPr>
+        <p:style>
+          <a:lnRef idx="2">
+            <a:schemeClr val="accent1">
+              <a:shade val="50000"/>
+            </a:schemeClr>
+          </a:lnRef>
+          <a:fillRef idx="1">
+            <a:schemeClr val="accent1"/>
+          </a:fillRef>
+          <a:effectRef idx="0">
+            <a:schemeClr val="accent1"/>
+          </a:effectRef>
+          <a:fontRef idx="minor">
+            <a:schemeClr val="lt1"/>
+          </a:fontRef>
+        </p:style>
+        <p:txBody>
+          <a:bodyPr rtlCol="0" anchor="ctr"/>
+          <a:lstStyle/>
+          <a:p>
+            <a:pPr algn="ctr"/>
+            <a:endParaRPr lang="en-US"/>
+          </a:p>
+        </p:txBody>
+      </p:sp>
+      <p:sp>
+        <p:nvSpPr>
+          <p:cNvPr id="45" name="Rectangle 44"/>
+          <p:cNvSpPr/>
+          <p:nvPr/>
+        </p:nvSpPr>
+        <p:spPr>
+          <a:xfrm>
+            <a:off x="6607162" y="4549515"/>
+            <a:ext cx="387347" cy="221381"/>
+          </a:xfrm>
+          <a:prstGeom prst="rect">
+            <a:avLst/>
+          </a:prstGeom>
+          <a:solidFill>
+            <a:srgbClr val="0070C0"/>
+          </a:solidFill>
+        </p:spPr>
+        <p:style>
+          <a:lnRef idx="2">
+            <a:schemeClr val="accent1">
+              <a:shade val="50000"/>
+            </a:schemeClr>
+          </a:lnRef>
+          <a:fillRef idx="1">
+            <a:schemeClr val="accent1"/>
+          </a:fillRef>
+          <a:effectRef idx="0">
+            <a:schemeClr val="accent1"/>
+          </a:effectRef>
+          <a:fontRef idx="minor">
+            <a:schemeClr val="lt1"/>
+          </a:fontRef>
+        </p:style>
+        <p:txBody>
+          <a:bodyPr rtlCol="0" anchor="ctr"/>
+          <a:lstStyle/>
+          <a:p>
+            <a:pPr algn="ctr"/>
+            <a:endParaRPr lang="en-US"/>
+          </a:p>
+        </p:txBody>
+      </p:sp>
+      <p:sp>
+        <p:nvSpPr>
+          <p:cNvPr id="48" name="Rectangle 47"/>
+          <p:cNvSpPr/>
+          <p:nvPr/>
+        </p:nvSpPr>
+        <p:spPr>
+          <a:xfrm>
+            <a:off x="6607162" y="3973737"/>
+            <a:ext cx="387347" cy="221381"/>
+          </a:xfrm>
+          <a:prstGeom prst="rect">
+            <a:avLst/>
+          </a:prstGeom>
+          <a:solidFill>
+            <a:srgbClr val="92D050"/>
+          </a:solidFill>
+        </p:spPr>
+        <p:style>
+          <a:lnRef idx="2">
+            <a:schemeClr val="accent1">
+              <a:shade val="50000"/>
+            </a:schemeClr>
+          </a:lnRef>
+          <a:fillRef idx="1">
+            <a:schemeClr val="accent1"/>
+          </a:fillRef>
+          <a:effectRef idx="0">
+            <a:schemeClr val="accent1"/>
+          </a:effectRef>
+          <a:fontRef idx="minor">
+            <a:schemeClr val="lt1"/>
+          </a:fontRef>
+        </p:style>
+        <p:txBody>
+          <a:bodyPr rtlCol="0" anchor="ctr"/>
+          <a:lstStyle/>
+          <a:p>
+            <a:pPr algn="ctr"/>
+            <a:endParaRPr lang="en-US"/>
+          </a:p>
+        </p:txBody>
+      </p:sp>
+      <p:sp>
+        <p:nvSpPr>
+          <p:cNvPr id="51" name="Rectangle 50"/>
+          <p:cNvSpPr/>
+          <p:nvPr/>
+        </p:nvSpPr>
+        <p:spPr>
+          <a:xfrm>
+            <a:off x="6607161" y="5200243"/>
+            <a:ext cx="387347" cy="221381"/>
+          </a:xfrm>
+          <a:prstGeom prst="rect">
+            <a:avLst/>
+          </a:prstGeom>
+          <a:solidFill>
+            <a:srgbClr val="00B0F0"/>
+          </a:solidFill>
+        </p:spPr>
+        <p:style>
+          <a:lnRef idx="2">
+            <a:schemeClr val="accent1">
+              <a:shade val="50000"/>
+            </a:schemeClr>
+          </a:lnRef>
+          <a:fillRef idx="1">
+            <a:schemeClr val="accent1"/>
+          </a:fillRef>
+          <a:effectRef idx="0">
+            <a:schemeClr val="accent1"/>
+          </a:effectRef>
+          <a:fontRef idx="minor">
+            <a:schemeClr val="lt1"/>
+          </a:fontRef>
+        </p:style>
+        <p:txBody>
+          <a:bodyPr rtlCol="0" anchor="ctr"/>
+          <a:lstStyle/>
+          <a:p>
+            <a:pPr algn="ctr"/>
+            <a:endParaRPr lang="en-US"/>
+          </a:p>
+        </p:txBody>
+      </p:sp>
+      <p:sp>
+        <p:nvSpPr>
+          <p:cNvPr id="52" name="Rectangle 51"/>
+          <p:cNvSpPr/>
+          <p:nvPr/>
+        </p:nvSpPr>
+        <p:spPr>
+          <a:xfrm>
+            <a:off x="6616189" y="6214850"/>
+            <a:ext cx="387347" cy="221381"/>
+          </a:xfrm>
+          <a:prstGeom prst="rect">
+            <a:avLst/>
+          </a:prstGeom>
+          <a:solidFill>
+            <a:schemeClr val="accent6">
+              <a:lumMod val="75000"/>
+            </a:schemeClr>
+          </a:solidFill>
+        </p:spPr>
+        <p:style>
+          <a:lnRef idx="2">
+            <a:schemeClr val="accent1">
+              <a:shade val="50000"/>
+            </a:schemeClr>
+          </a:lnRef>
+          <a:fillRef idx="1">
+            <a:schemeClr val="accent1"/>
+          </a:fillRef>
+          <a:effectRef idx="0">
+            <a:schemeClr val="accent1"/>
+          </a:effectRef>
+          <a:fontRef idx="minor">
+            <a:schemeClr val="lt1"/>
+          </a:fontRef>
+        </p:style>
+        <p:txBody>
+          <a:bodyPr rtlCol="0" anchor="ctr"/>
+          <a:lstStyle/>
+          <a:p>
+            <a:pPr algn="ctr"/>
+            <a:endParaRPr lang="en-US"/>
+          </a:p>
+        </p:txBody>
+      </p:sp>
     </p:spTree>
     <p:extLst>
       <p:ext uri="{BB962C8B-B14F-4D97-AF65-F5344CB8AC3E}">
-        <p14:creationId xmlns="" xmlns:p14="http://schemas.microsoft.com/office/powerpoint/2010/main" val="582383660"/>
+        <p14:creationId xmlns:p14="http://schemas.microsoft.com/office/powerpoint/2010/main" xmlns="" val="582383660"/>
       </p:ext>
     </p:extLst>
   </p:cSld>
@@ -6085,7 +6438,7 @@
   <a:extraClrSchemeLst/>
   <a:extLst>
     <a:ext uri="{05A4C25C-085E-4340-85A3-A5531E510DB2}">
-      <thm15:themeFamily xmlns="" xmlns:thm15="http://schemas.microsoft.com/office/thememl/2012/main" name="Office Theme" id="{62F939B6-93AF-4DB8-9C6B-D6C7DFDC589F}" vid="{4A3C46E8-61CC-4603-A589-7422A47A8E4A}"/>
+      <thm15:themeFamily xmlns:thm15="http://schemas.microsoft.com/office/thememl/2012/main" xmlns="" name="Office Theme" id="{62F939B6-93AF-4DB8-9C6B-D6C7DFDC589F}" vid="{4A3C46E8-61CC-4603-A589-7422A47A8E4A}"/>
     </a:ext>
   </a:extLst>
 </a:theme>

</xml_diff>